<commit_message>
Before Sample with HP
</commit_message>
<xml_diff>
--- a/artikel/Diagrams.pptx
+++ b/artikel/Diagrams.pptx
@@ -7,8 +7,9 @@
   <p:sldIdLst>
     <p:sldId id="256" r:id="rId2"/>
     <p:sldId id="259" r:id="rId3"/>
-    <p:sldId id="258" r:id="rId4"/>
-    <p:sldId id="257" r:id="rId5"/>
+    <p:sldId id="260" r:id="rId4"/>
+    <p:sldId id="258" r:id="rId5"/>
+    <p:sldId id="257" r:id="rId6"/>
   </p:sldIdLst>
   <p:sldSz cx="18000663" cy="10799763"/>
   <p:notesSz cx="6858000" cy="9144000"/>
@@ -118,7 +119,7 @@
 <file path=ppt/revisionInfo.xml><?xml version="1.0" encoding="utf-8"?>
 <p1510:revInfo xmlns:a="http://schemas.openxmlformats.org/drawingml/2006/main" xmlns:r="http://schemas.openxmlformats.org/officeDocument/2006/relationships" xmlns:p1510="http://schemas.microsoft.com/office/powerpoint/2015/10/main">
   <p1510:revLst>
-    <p1510:client id="{C90EE19E-0B24-44E0-8E69-0500D5924BD1}" v="56" dt="2019-04-07T09:10:20.621"/>
+    <p1510:client id="{C90EE19E-0B24-44E0-8E69-0500D5924BD1}" v="58" dt="2019-04-09T15:46:44.452"/>
   </p1510:revLst>
 </p1510:revInfo>
 </file>
@@ -128,7 +129,7 @@
   <pc:docChgLst>
     <pc:chgData name="I Didntdoit" userId="5eebce3a00c84678" providerId="LiveId" clId="{C90EE19E-0B24-44E0-8E69-0500D5924BD1}"/>
     <pc:docChg chg="undo custSel addSld delSld modSld sldOrd modMainMaster">
-      <pc:chgData name="I Didntdoit" userId="5eebce3a00c84678" providerId="LiveId" clId="{C90EE19E-0B24-44E0-8E69-0500D5924BD1}" dt="2019-04-07T09:12:16.503" v="687" actId="1076"/>
+      <pc:chgData name="I Didntdoit" userId="5eebce3a00c84678" providerId="LiveId" clId="{C90EE19E-0B24-44E0-8E69-0500D5924BD1}" dt="2019-04-09T15:49:28.228" v="776" actId="20577"/>
       <pc:docMkLst>
         <pc:docMk/>
       </pc:docMkLst>
@@ -491,8 +492,8 @@
           </ac:cxnSpMkLst>
         </pc:cxnChg>
       </pc:sldChg>
-      <pc:sldChg chg="addSp delSp modSp add">
-        <pc:chgData name="I Didntdoit" userId="5eebce3a00c84678" providerId="LiveId" clId="{C90EE19E-0B24-44E0-8E69-0500D5924BD1}" dt="2019-04-07T08:30:03.625" v="277" actId="478"/>
+      <pc:sldChg chg="addSp delSp modSp add mod modTransition modShow">
+        <pc:chgData name="I Didntdoit" userId="5eebce3a00c84678" providerId="LiveId" clId="{C90EE19E-0B24-44E0-8E69-0500D5924BD1}" dt="2019-04-09T15:48:54.178" v="769"/>
         <pc:sldMkLst>
           <pc:docMk/>
           <pc:sldMk cId="3019384575" sldId="257"/>
@@ -522,247 +523,8 @@
           </ac:spMkLst>
         </pc:spChg>
       </pc:sldChg>
-      <pc:sldChg chg="modSp add del">
-        <pc:chgData name="I Didntdoit" userId="5eebce3a00c84678" providerId="LiveId" clId="{C90EE19E-0B24-44E0-8E69-0500D5924BD1}" dt="2019-04-06T19:34:09.530" v="203" actId="47"/>
-        <pc:sldMkLst>
-          <pc:docMk/>
-          <pc:sldMk cId="3815227500" sldId="257"/>
-        </pc:sldMkLst>
-        <pc:spChg chg="mod">
-          <ac:chgData name="I Didntdoit" userId="5eebce3a00c84678" providerId="LiveId" clId="{C90EE19E-0B24-44E0-8E69-0500D5924BD1}" dt="2019-04-06T19:33:14.572" v="201"/>
-          <ac:spMkLst>
-            <pc:docMk/>
-            <pc:sldMk cId="3815227500" sldId="257"/>
-            <ac:spMk id="4" creationId="{EABC0166-CCFE-45F5-A572-BA71CA4AC7AA}"/>
-          </ac:spMkLst>
-        </pc:spChg>
-        <pc:spChg chg="mod">
-          <ac:chgData name="I Didntdoit" userId="5eebce3a00c84678" providerId="LiveId" clId="{C90EE19E-0B24-44E0-8E69-0500D5924BD1}" dt="2019-04-06T19:33:14.572" v="201"/>
-          <ac:spMkLst>
-            <pc:docMk/>
-            <pc:sldMk cId="3815227500" sldId="257"/>
-            <ac:spMk id="8" creationId="{7792323A-2C39-477F-B727-B3A32B620F4F}"/>
-          </ac:spMkLst>
-        </pc:spChg>
-        <pc:spChg chg="mod">
-          <ac:chgData name="I Didntdoit" userId="5eebce3a00c84678" providerId="LiveId" clId="{C90EE19E-0B24-44E0-8E69-0500D5924BD1}" dt="2019-04-06T19:33:14.572" v="201"/>
-          <ac:spMkLst>
-            <pc:docMk/>
-            <pc:sldMk cId="3815227500" sldId="257"/>
-            <ac:spMk id="9" creationId="{D556A1E1-4E12-4CCC-8DFE-1DBD02677F9B}"/>
-          </ac:spMkLst>
-        </pc:spChg>
-        <pc:spChg chg="mod">
-          <ac:chgData name="I Didntdoit" userId="5eebce3a00c84678" providerId="LiveId" clId="{C90EE19E-0B24-44E0-8E69-0500D5924BD1}" dt="2019-04-06T19:33:14.572" v="201"/>
-          <ac:spMkLst>
-            <pc:docMk/>
-            <pc:sldMk cId="3815227500" sldId="257"/>
-            <ac:spMk id="11" creationId="{CA18DB35-6FF7-45C5-8D81-1704AC7F3931}"/>
-          </ac:spMkLst>
-        </pc:spChg>
-        <pc:spChg chg="mod">
-          <ac:chgData name="I Didntdoit" userId="5eebce3a00c84678" providerId="LiveId" clId="{C90EE19E-0B24-44E0-8E69-0500D5924BD1}" dt="2019-04-06T19:33:14.572" v="201"/>
-          <ac:spMkLst>
-            <pc:docMk/>
-            <pc:sldMk cId="3815227500" sldId="257"/>
-            <ac:spMk id="12" creationId="{A0289756-56F0-4257-B9DB-2D9C892B4F2A}"/>
-          </ac:spMkLst>
-        </pc:spChg>
-        <pc:spChg chg="mod">
-          <ac:chgData name="I Didntdoit" userId="5eebce3a00c84678" providerId="LiveId" clId="{C90EE19E-0B24-44E0-8E69-0500D5924BD1}" dt="2019-04-06T19:33:14.572" v="201"/>
-          <ac:spMkLst>
-            <pc:docMk/>
-            <pc:sldMk cId="3815227500" sldId="257"/>
-            <ac:spMk id="14" creationId="{262C1556-A3F6-4075-A5D7-ABB00A050D7A}"/>
-          </ac:spMkLst>
-        </pc:spChg>
-        <pc:spChg chg="mod">
-          <ac:chgData name="I Didntdoit" userId="5eebce3a00c84678" providerId="LiveId" clId="{C90EE19E-0B24-44E0-8E69-0500D5924BD1}" dt="2019-04-06T19:33:14.572" v="201"/>
-          <ac:spMkLst>
-            <pc:docMk/>
-            <pc:sldMk cId="3815227500" sldId="257"/>
-            <ac:spMk id="15" creationId="{B36914A0-107C-4C11-97A8-08F2D87F144A}"/>
-          </ac:spMkLst>
-        </pc:spChg>
-        <pc:spChg chg="mod">
-          <ac:chgData name="I Didntdoit" userId="5eebce3a00c84678" providerId="LiveId" clId="{C90EE19E-0B24-44E0-8E69-0500D5924BD1}" dt="2019-04-06T19:33:14.572" v="201"/>
-          <ac:spMkLst>
-            <pc:docMk/>
-            <pc:sldMk cId="3815227500" sldId="257"/>
-            <ac:spMk id="17" creationId="{1408AC06-CDB7-4551-85B4-15A77054EF1F}"/>
-          </ac:spMkLst>
-        </pc:spChg>
-        <pc:spChg chg="mod">
-          <ac:chgData name="I Didntdoit" userId="5eebce3a00c84678" providerId="LiveId" clId="{C90EE19E-0B24-44E0-8E69-0500D5924BD1}" dt="2019-04-06T19:33:14.572" v="201"/>
-          <ac:spMkLst>
-            <pc:docMk/>
-            <pc:sldMk cId="3815227500" sldId="257"/>
-            <ac:spMk id="18" creationId="{6E644A42-C4CC-4590-AC74-A8953C1E0A18}"/>
-          </ac:spMkLst>
-        </pc:spChg>
-        <pc:spChg chg="mod">
-          <ac:chgData name="I Didntdoit" userId="5eebce3a00c84678" providerId="LiveId" clId="{C90EE19E-0B24-44E0-8E69-0500D5924BD1}" dt="2019-04-06T19:33:14.572" v="201"/>
-          <ac:spMkLst>
-            <pc:docMk/>
-            <pc:sldMk cId="3815227500" sldId="257"/>
-            <ac:spMk id="20" creationId="{72EF9F16-3BEB-41F2-BEBB-33F2ED35CBD2}"/>
-          </ac:spMkLst>
-        </pc:spChg>
-        <pc:spChg chg="mod">
-          <ac:chgData name="I Didntdoit" userId="5eebce3a00c84678" providerId="LiveId" clId="{C90EE19E-0B24-44E0-8E69-0500D5924BD1}" dt="2019-04-06T19:33:14.572" v="201"/>
-          <ac:spMkLst>
-            <pc:docMk/>
-            <pc:sldMk cId="3815227500" sldId="257"/>
-            <ac:spMk id="38" creationId="{9B4C003B-908E-4BF5-ACB8-2803BD542F5D}"/>
-          </ac:spMkLst>
-        </pc:spChg>
-        <pc:spChg chg="mod">
-          <ac:chgData name="I Didntdoit" userId="5eebce3a00c84678" providerId="LiveId" clId="{C90EE19E-0B24-44E0-8E69-0500D5924BD1}" dt="2019-04-06T19:33:14.572" v="201"/>
-          <ac:spMkLst>
-            <pc:docMk/>
-            <pc:sldMk cId="3815227500" sldId="257"/>
-            <ac:spMk id="39" creationId="{26259984-08FA-4C81-8FD1-3F0483408450}"/>
-          </ac:spMkLst>
-        </pc:spChg>
-        <pc:spChg chg="mod">
-          <ac:chgData name="I Didntdoit" userId="5eebce3a00c84678" providerId="LiveId" clId="{C90EE19E-0B24-44E0-8E69-0500D5924BD1}" dt="2019-04-06T19:33:14.572" v="201"/>
-          <ac:spMkLst>
-            <pc:docMk/>
-            <pc:sldMk cId="3815227500" sldId="257"/>
-            <ac:spMk id="40" creationId="{F585BD6B-43D0-47D7-891C-197F0BA57AA3}"/>
-          </ac:spMkLst>
-        </pc:spChg>
-        <pc:spChg chg="mod">
-          <ac:chgData name="I Didntdoit" userId="5eebce3a00c84678" providerId="LiveId" clId="{C90EE19E-0B24-44E0-8E69-0500D5924BD1}" dt="2019-04-06T19:33:14.572" v="201"/>
-          <ac:spMkLst>
-            <pc:docMk/>
-            <pc:sldMk cId="3815227500" sldId="257"/>
-            <ac:spMk id="42" creationId="{84444DCF-C62D-4397-9B38-8208F6D67410}"/>
-          </ac:spMkLst>
-        </pc:spChg>
-        <pc:spChg chg="mod">
-          <ac:chgData name="I Didntdoit" userId="5eebce3a00c84678" providerId="LiveId" clId="{C90EE19E-0B24-44E0-8E69-0500D5924BD1}" dt="2019-04-06T19:33:14.572" v="201"/>
-          <ac:spMkLst>
-            <pc:docMk/>
-            <pc:sldMk cId="3815227500" sldId="257"/>
-            <ac:spMk id="46" creationId="{0CD61A1B-EC03-4BC6-BE8B-02A4F3849625}"/>
-          </ac:spMkLst>
-        </pc:spChg>
-        <pc:spChg chg="mod">
-          <ac:chgData name="I Didntdoit" userId="5eebce3a00c84678" providerId="LiveId" clId="{C90EE19E-0B24-44E0-8E69-0500D5924BD1}" dt="2019-04-06T19:33:14.572" v="201"/>
-          <ac:spMkLst>
-            <pc:docMk/>
-            <pc:sldMk cId="3815227500" sldId="257"/>
-            <ac:spMk id="47" creationId="{354285E1-3048-4875-A008-18D8F7566451}"/>
-          </ac:spMkLst>
-        </pc:spChg>
-        <pc:spChg chg="mod">
-          <ac:chgData name="I Didntdoit" userId="5eebce3a00c84678" providerId="LiveId" clId="{C90EE19E-0B24-44E0-8E69-0500D5924BD1}" dt="2019-04-06T19:33:14.572" v="201"/>
-          <ac:spMkLst>
-            <pc:docMk/>
-            <pc:sldMk cId="3815227500" sldId="257"/>
-            <ac:spMk id="48" creationId="{359D8A63-3101-4B6E-A53F-FE4568BEEE5C}"/>
-          </ac:spMkLst>
-        </pc:spChg>
-        <pc:spChg chg="mod">
-          <ac:chgData name="I Didntdoit" userId="5eebce3a00c84678" providerId="LiveId" clId="{C90EE19E-0B24-44E0-8E69-0500D5924BD1}" dt="2019-04-06T19:33:14.572" v="201"/>
-          <ac:spMkLst>
-            <pc:docMk/>
-            <pc:sldMk cId="3815227500" sldId="257"/>
-            <ac:spMk id="51" creationId="{CE6BB37B-BC30-4B91-80F0-72505AC8A7A9}"/>
-          </ac:spMkLst>
-        </pc:spChg>
-        <pc:spChg chg="mod">
-          <ac:chgData name="I Didntdoit" userId="5eebce3a00c84678" providerId="LiveId" clId="{C90EE19E-0B24-44E0-8E69-0500D5924BD1}" dt="2019-04-06T19:33:14.572" v="201"/>
-          <ac:spMkLst>
-            <pc:docMk/>
-            <pc:sldMk cId="3815227500" sldId="257"/>
-            <ac:spMk id="53" creationId="{1AA13C96-DA95-442D-A1F6-4A4F7485B3AC}"/>
-          </ac:spMkLst>
-        </pc:spChg>
-        <pc:cxnChg chg="mod">
-          <ac:chgData name="I Didntdoit" userId="5eebce3a00c84678" providerId="LiveId" clId="{C90EE19E-0B24-44E0-8E69-0500D5924BD1}" dt="2019-04-06T19:33:14.572" v="201"/>
-          <ac:cxnSpMkLst>
-            <pc:docMk/>
-            <pc:sldMk cId="3815227500" sldId="257"/>
-            <ac:cxnSpMk id="6" creationId="{112616AF-3B15-4044-821F-3362FF98A7D7}"/>
-          </ac:cxnSpMkLst>
-        </pc:cxnChg>
-        <pc:cxnChg chg="mod">
-          <ac:chgData name="I Didntdoit" userId="5eebce3a00c84678" providerId="LiveId" clId="{C90EE19E-0B24-44E0-8E69-0500D5924BD1}" dt="2019-04-06T19:33:14.572" v="201"/>
-          <ac:cxnSpMkLst>
-            <pc:docMk/>
-            <pc:sldMk cId="3815227500" sldId="257"/>
-            <ac:cxnSpMk id="10" creationId="{51AB43CD-8A0A-46BA-B5B8-34D071CBD4B4}"/>
-          </ac:cxnSpMkLst>
-        </pc:cxnChg>
-        <pc:cxnChg chg="mod">
-          <ac:chgData name="I Didntdoit" userId="5eebce3a00c84678" providerId="LiveId" clId="{C90EE19E-0B24-44E0-8E69-0500D5924BD1}" dt="2019-04-06T19:33:14.572" v="201"/>
-          <ac:cxnSpMkLst>
-            <pc:docMk/>
-            <pc:sldMk cId="3815227500" sldId="257"/>
-            <ac:cxnSpMk id="13" creationId="{3744FB7D-4D46-4B08-A423-E8F4DFD503A8}"/>
-          </ac:cxnSpMkLst>
-        </pc:cxnChg>
-        <pc:cxnChg chg="mod">
-          <ac:chgData name="I Didntdoit" userId="5eebce3a00c84678" providerId="LiveId" clId="{C90EE19E-0B24-44E0-8E69-0500D5924BD1}" dt="2019-04-06T19:33:14.572" v="201"/>
-          <ac:cxnSpMkLst>
-            <pc:docMk/>
-            <pc:sldMk cId="3815227500" sldId="257"/>
-            <ac:cxnSpMk id="19" creationId="{480A16E3-E983-45EB-AB8C-3CEEF2D2B4DA}"/>
-          </ac:cxnSpMkLst>
-        </pc:cxnChg>
-        <pc:cxnChg chg="mod">
-          <ac:chgData name="I Didntdoit" userId="5eebce3a00c84678" providerId="LiveId" clId="{C90EE19E-0B24-44E0-8E69-0500D5924BD1}" dt="2019-04-06T19:33:14.572" v="201"/>
-          <ac:cxnSpMkLst>
-            <pc:docMk/>
-            <pc:sldMk cId="3815227500" sldId="257"/>
-            <ac:cxnSpMk id="22" creationId="{D0A1946F-F14D-4545-8DEC-05C001FDB7D7}"/>
-          </ac:cxnSpMkLst>
-        </pc:cxnChg>
-        <pc:cxnChg chg="mod">
-          <ac:chgData name="I Didntdoit" userId="5eebce3a00c84678" providerId="LiveId" clId="{C90EE19E-0B24-44E0-8E69-0500D5924BD1}" dt="2019-04-06T19:33:14.572" v="201"/>
-          <ac:cxnSpMkLst>
-            <pc:docMk/>
-            <pc:sldMk cId="3815227500" sldId="257"/>
-            <ac:cxnSpMk id="41" creationId="{C675EF59-6BB0-49E9-BBA0-0C4F7EA1A280}"/>
-          </ac:cxnSpMkLst>
-        </pc:cxnChg>
-        <pc:cxnChg chg="mod">
-          <ac:chgData name="I Didntdoit" userId="5eebce3a00c84678" providerId="LiveId" clId="{C90EE19E-0B24-44E0-8E69-0500D5924BD1}" dt="2019-04-06T19:33:14.572" v="201"/>
-          <ac:cxnSpMkLst>
-            <pc:docMk/>
-            <pc:sldMk cId="3815227500" sldId="257"/>
-            <ac:cxnSpMk id="52" creationId="{FB7B5AE8-BAA3-48C9-A334-85027489CE01}"/>
-          </ac:cxnSpMkLst>
-        </pc:cxnChg>
-        <pc:cxnChg chg="mod">
-          <ac:chgData name="I Didntdoit" userId="5eebce3a00c84678" providerId="LiveId" clId="{C90EE19E-0B24-44E0-8E69-0500D5924BD1}" dt="2019-04-06T19:33:14.572" v="201"/>
-          <ac:cxnSpMkLst>
-            <pc:docMk/>
-            <pc:sldMk cId="3815227500" sldId="257"/>
-            <ac:cxnSpMk id="55" creationId="{E261E7F9-A5F5-4B84-A631-335DB0506E93}"/>
-          </ac:cxnSpMkLst>
-        </pc:cxnChg>
-        <pc:cxnChg chg="mod">
-          <ac:chgData name="I Didntdoit" userId="5eebce3a00c84678" providerId="LiveId" clId="{C90EE19E-0B24-44E0-8E69-0500D5924BD1}" dt="2019-04-06T19:33:14.572" v="201"/>
-          <ac:cxnSpMkLst>
-            <pc:docMk/>
-            <pc:sldMk cId="3815227500" sldId="257"/>
-            <ac:cxnSpMk id="60" creationId="{504F5569-CAE0-4D51-85DD-681CCD983651}"/>
-          </ac:cxnSpMkLst>
-        </pc:cxnChg>
-        <pc:cxnChg chg="mod">
-          <ac:chgData name="I Didntdoit" userId="5eebce3a00c84678" providerId="LiveId" clId="{C90EE19E-0B24-44E0-8E69-0500D5924BD1}" dt="2019-04-06T19:33:14.572" v="201"/>
-          <ac:cxnSpMkLst>
-            <pc:docMk/>
-            <pc:sldMk cId="3815227500" sldId="257"/>
-            <ac:cxnSpMk id="64" creationId="{41CCF889-5796-4721-9FB6-7898EDD3C46A}"/>
-          </ac:cxnSpMkLst>
-        </pc:cxnChg>
-      </pc:sldChg>
-      <pc:sldChg chg="addSp modSp add ord">
-        <pc:chgData name="I Didntdoit" userId="5eebce3a00c84678" providerId="LiveId" clId="{C90EE19E-0B24-44E0-8E69-0500D5924BD1}" dt="2019-04-07T08:47:29.635" v="435"/>
+      <pc:sldChg chg="addSp modSp add mod ord modTransition modShow">
+        <pc:chgData name="I Didntdoit" userId="5eebce3a00c84678" providerId="LiveId" clId="{C90EE19E-0B24-44E0-8E69-0500D5924BD1}" dt="2019-04-09T15:48:51.963" v="767"/>
         <pc:sldMkLst>
           <pc:docMk/>
           <pc:sldMk cId="2373027013" sldId="258"/>
@@ -920,8 +682,8 @@
           </ac:cxnSpMkLst>
         </pc:cxnChg>
       </pc:sldChg>
-      <pc:sldChg chg="addSp delSp modSp add">
-        <pc:chgData name="I Didntdoit" userId="5eebce3a00c84678" providerId="LiveId" clId="{C90EE19E-0B24-44E0-8E69-0500D5924BD1}" dt="2019-04-07T09:12:16.503" v="687" actId="1076"/>
+      <pc:sldChg chg="addSp delSp modSp add mod modTransition modShow">
+        <pc:chgData name="I Didntdoit" userId="5eebce3a00c84678" providerId="LiveId" clId="{C90EE19E-0B24-44E0-8E69-0500D5924BD1}" dt="2019-04-09T15:43:00.182" v="690"/>
         <pc:sldMkLst>
           <pc:docMk/>
           <pc:sldMk cId="277716076" sldId="259"/>
@@ -1279,280 +1041,325 @@
           </ac:cxnSpMkLst>
         </pc:cxnChg>
       </pc:sldChg>
-      <pc:sldMasterChg chg="modSp modSldLayout">
-        <pc:chgData name="I Didntdoit" userId="5eebce3a00c84678" providerId="LiveId" clId="{C90EE19E-0B24-44E0-8E69-0500D5924BD1}" dt="2019-04-06T19:33:14.572" v="201"/>
-        <pc:sldMasterMkLst>
+      <pc:sldChg chg="addSp delSp modSp add">
+        <pc:chgData name="I Didntdoit" userId="5eebce3a00c84678" providerId="LiveId" clId="{C90EE19E-0B24-44E0-8E69-0500D5924BD1}" dt="2019-04-09T15:49:28.228" v="776" actId="20577"/>
+        <pc:sldMkLst>
           <pc:docMk/>
-          <pc:sldMasterMk cId="966135916" sldId="2147483648"/>
-        </pc:sldMasterMkLst>
+          <pc:sldMk cId="3931559329" sldId="260"/>
+        </pc:sldMkLst>
         <pc:spChg chg="mod">
-          <ac:chgData name="I Didntdoit" userId="5eebce3a00c84678" providerId="LiveId" clId="{C90EE19E-0B24-44E0-8E69-0500D5924BD1}" dt="2019-04-06T19:33:14.572" v="201"/>
+          <ac:chgData name="I Didntdoit" userId="5eebce3a00c84678" providerId="LiveId" clId="{C90EE19E-0B24-44E0-8E69-0500D5924BD1}" dt="2019-04-09T15:48:34.694" v="765" actId="20577"/>
           <ac:spMkLst>
             <pc:docMk/>
-            <pc:sldMasterMk cId="966135916" sldId="2147483648"/>
-            <ac:spMk id="2" creationId="{DD5B0B82-9339-42A7-AEAC-C0506576EB3A}"/>
+            <pc:sldMk cId="3931559329" sldId="260"/>
+            <ac:spMk id="11" creationId="{CA18DB35-6FF7-45C5-8D81-1704AC7F3931}"/>
           </ac:spMkLst>
         </pc:spChg>
         <pc:spChg chg="mod">
-          <ac:chgData name="I Didntdoit" userId="5eebce3a00c84678" providerId="LiveId" clId="{C90EE19E-0B24-44E0-8E69-0500D5924BD1}" dt="2019-04-06T19:33:14.572" v="201"/>
+          <ac:chgData name="I Didntdoit" userId="5eebce3a00c84678" providerId="LiveId" clId="{C90EE19E-0B24-44E0-8E69-0500D5924BD1}" dt="2019-04-09T15:47:40.750" v="752" actId="14100"/>
           <ac:spMkLst>
             <pc:docMk/>
-            <pc:sldMasterMk cId="966135916" sldId="2147483648"/>
-            <ac:spMk id="3" creationId="{74CAD171-06EB-4C51-BB14-4642F0A20E03}"/>
+            <pc:sldMk cId="3931559329" sldId="260"/>
+            <ac:spMk id="12" creationId="{A0289756-56F0-4257-B9DB-2D9C892B4F2A}"/>
           </ac:spMkLst>
         </pc:spChg>
         <pc:spChg chg="mod">
-          <ac:chgData name="I Didntdoit" userId="5eebce3a00c84678" providerId="LiveId" clId="{C90EE19E-0B24-44E0-8E69-0500D5924BD1}" dt="2019-04-06T19:33:14.572" v="201"/>
+          <ac:chgData name="I Didntdoit" userId="5eebce3a00c84678" providerId="LiveId" clId="{C90EE19E-0B24-44E0-8E69-0500D5924BD1}" dt="2019-04-09T15:47:27.129" v="751" actId="1076"/>
           <ac:spMkLst>
             <pc:docMk/>
-            <pc:sldMasterMk cId="966135916" sldId="2147483648"/>
-            <ac:spMk id="4" creationId="{3A470289-1D90-4A46-ADEB-56A5AEFE79BC}"/>
+            <pc:sldMk cId="3931559329" sldId="260"/>
+            <ac:spMk id="14" creationId="{262C1556-A3F6-4075-A5D7-ABB00A050D7A}"/>
           </ac:spMkLst>
         </pc:spChg>
         <pc:spChg chg="mod">
-          <ac:chgData name="I Didntdoit" userId="5eebce3a00c84678" providerId="LiveId" clId="{C90EE19E-0B24-44E0-8E69-0500D5924BD1}" dt="2019-04-06T19:33:14.572" v="201"/>
+          <ac:chgData name="I Didntdoit" userId="5eebce3a00c84678" providerId="LiveId" clId="{C90EE19E-0B24-44E0-8E69-0500D5924BD1}" dt="2019-04-09T15:46:33.251" v="738" actId="1076"/>
           <ac:spMkLst>
             <pc:docMk/>
-            <pc:sldMasterMk cId="966135916" sldId="2147483648"/>
-            <ac:spMk id="5" creationId="{9AF0262B-663A-4A04-A7A3-4704D41BAC15}"/>
+            <pc:sldMk cId="3931559329" sldId="260"/>
+            <ac:spMk id="20" creationId="{72EF9F16-3BEB-41F2-BEBB-33F2ED35CBD2}"/>
+          </ac:spMkLst>
+        </pc:spChg>
+        <pc:spChg chg="del mod">
+          <ac:chgData name="I Didntdoit" userId="5eebce3a00c84678" providerId="LiveId" clId="{C90EE19E-0B24-44E0-8E69-0500D5924BD1}" dt="2019-04-09T15:45:34.074" v="731" actId="478"/>
+          <ac:spMkLst>
+            <pc:docMk/>
+            <pc:sldMk cId="3931559329" sldId="260"/>
+            <ac:spMk id="29" creationId="{48304A6B-7051-4D65-8848-C5DAD59E7662}"/>
+          </ac:spMkLst>
+        </pc:spChg>
+        <pc:spChg chg="del mod">
+          <ac:chgData name="I Didntdoit" userId="5eebce3a00c84678" providerId="LiveId" clId="{C90EE19E-0B24-44E0-8E69-0500D5924BD1}" dt="2019-04-09T15:45:28.256" v="727" actId="478"/>
+          <ac:spMkLst>
+            <pc:docMk/>
+            <pc:sldMk cId="3931559329" sldId="260"/>
+            <ac:spMk id="34" creationId="{B3E01352-A898-410A-9046-1C4BA0E8EA38}"/>
           </ac:spMkLst>
         </pc:spChg>
         <pc:spChg chg="mod">
-          <ac:chgData name="I Didntdoit" userId="5eebce3a00c84678" providerId="LiveId" clId="{C90EE19E-0B24-44E0-8E69-0500D5924BD1}" dt="2019-04-06T19:33:14.572" v="201"/>
+          <ac:chgData name="I Didntdoit" userId="5eebce3a00c84678" providerId="LiveId" clId="{C90EE19E-0B24-44E0-8E69-0500D5924BD1}" dt="2019-04-09T15:46:33.251" v="738" actId="1076"/>
           <ac:spMkLst>
             <pc:docMk/>
-            <pc:sldMasterMk cId="966135916" sldId="2147483648"/>
-            <ac:spMk id="6" creationId="{7355A97F-12E8-49C7-9BD2-3BB9A43FC9AD}"/>
+            <pc:sldMk cId="3931559329" sldId="260"/>
+            <ac:spMk id="42" creationId="{84444DCF-C62D-4397-9B38-8208F6D67410}"/>
           </ac:spMkLst>
         </pc:spChg>
-        <pc:sldLayoutChg chg="modSp">
-          <pc:chgData name="I Didntdoit" userId="5eebce3a00c84678" providerId="LiveId" clId="{C90EE19E-0B24-44E0-8E69-0500D5924BD1}" dt="2019-04-06T19:33:14.572" v="201"/>
-          <pc:sldLayoutMkLst>
-            <pc:docMk/>
-            <pc:sldMasterMk cId="966135916" sldId="2147483648"/>
-            <pc:sldLayoutMk cId="3041402684" sldId="2147483649"/>
-          </pc:sldLayoutMkLst>
-          <pc:spChg chg="mod">
-            <ac:chgData name="I Didntdoit" userId="5eebce3a00c84678" providerId="LiveId" clId="{C90EE19E-0B24-44E0-8E69-0500D5924BD1}" dt="2019-04-06T19:33:14.572" v="201"/>
-            <ac:spMkLst>
-              <pc:docMk/>
-              <pc:sldMasterMk cId="966135916" sldId="2147483648"/>
-              <pc:sldLayoutMk cId="3041402684" sldId="2147483649"/>
-              <ac:spMk id="2" creationId="{3C610E72-2878-4851-878B-3AA62726B294}"/>
-            </ac:spMkLst>
-          </pc:spChg>
-          <pc:spChg chg="mod">
-            <ac:chgData name="I Didntdoit" userId="5eebce3a00c84678" providerId="LiveId" clId="{C90EE19E-0B24-44E0-8E69-0500D5924BD1}" dt="2019-04-06T19:33:14.572" v="201"/>
-            <ac:spMkLst>
-              <pc:docMk/>
-              <pc:sldMasterMk cId="966135916" sldId="2147483648"/>
-              <pc:sldLayoutMk cId="3041402684" sldId="2147483649"/>
-              <ac:spMk id="3" creationId="{7E05925C-EE3B-40BB-A24D-6F34DD7FCB13}"/>
-            </ac:spMkLst>
-          </pc:spChg>
-        </pc:sldLayoutChg>
-        <pc:sldLayoutChg chg="modSp">
-          <pc:chgData name="I Didntdoit" userId="5eebce3a00c84678" providerId="LiveId" clId="{C90EE19E-0B24-44E0-8E69-0500D5924BD1}" dt="2019-04-06T19:33:14.572" v="201"/>
-          <pc:sldLayoutMkLst>
-            <pc:docMk/>
-            <pc:sldMasterMk cId="966135916" sldId="2147483648"/>
-            <pc:sldLayoutMk cId="807426810" sldId="2147483651"/>
-          </pc:sldLayoutMkLst>
-          <pc:spChg chg="mod">
-            <ac:chgData name="I Didntdoit" userId="5eebce3a00c84678" providerId="LiveId" clId="{C90EE19E-0B24-44E0-8E69-0500D5924BD1}" dt="2019-04-06T19:33:14.572" v="201"/>
-            <ac:spMkLst>
-              <pc:docMk/>
-              <pc:sldMasterMk cId="966135916" sldId="2147483648"/>
-              <pc:sldLayoutMk cId="807426810" sldId="2147483651"/>
-              <ac:spMk id="2" creationId="{C85F03C5-D3AA-4E30-AE41-47CE600C1AE7}"/>
-            </ac:spMkLst>
-          </pc:spChg>
-          <pc:spChg chg="mod">
-            <ac:chgData name="I Didntdoit" userId="5eebce3a00c84678" providerId="LiveId" clId="{C90EE19E-0B24-44E0-8E69-0500D5924BD1}" dt="2019-04-06T19:33:14.572" v="201"/>
-            <ac:spMkLst>
-              <pc:docMk/>
-              <pc:sldMasterMk cId="966135916" sldId="2147483648"/>
-              <pc:sldLayoutMk cId="807426810" sldId="2147483651"/>
-              <ac:spMk id="3" creationId="{D82D6692-DC53-42A1-ABFC-21FCBF98A708}"/>
-            </ac:spMkLst>
-          </pc:spChg>
-        </pc:sldLayoutChg>
-        <pc:sldLayoutChg chg="modSp">
-          <pc:chgData name="I Didntdoit" userId="5eebce3a00c84678" providerId="LiveId" clId="{C90EE19E-0B24-44E0-8E69-0500D5924BD1}" dt="2019-04-06T19:33:14.572" v="201"/>
-          <pc:sldLayoutMkLst>
-            <pc:docMk/>
-            <pc:sldMasterMk cId="966135916" sldId="2147483648"/>
-            <pc:sldLayoutMk cId="4166362897" sldId="2147483652"/>
-          </pc:sldLayoutMkLst>
-          <pc:spChg chg="mod">
-            <ac:chgData name="I Didntdoit" userId="5eebce3a00c84678" providerId="LiveId" clId="{C90EE19E-0B24-44E0-8E69-0500D5924BD1}" dt="2019-04-06T19:33:14.572" v="201"/>
-            <ac:spMkLst>
-              <pc:docMk/>
-              <pc:sldMasterMk cId="966135916" sldId="2147483648"/>
-              <pc:sldLayoutMk cId="4166362897" sldId="2147483652"/>
-              <ac:spMk id="3" creationId="{42BB1781-9B3C-4AA4-B306-68FD1B0FC062}"/>
-            </ac:spMkLst>
-          </pc:spChg>
-          <pc:spChg chg="mod">
-            <ac:chgData name="I Didntdoit" userId="5eebce3a00c84678" providerId="LiveId" clId="{C90EE19E-0B24-44E0-8E69-0500D5924BD1}" dt="2019-04-06T19:33:14.572" v="201"/>
-            <ac:spMkLst>
-              <pc:docMk/>
-              <pc:sldMasterMk cId="966135916" sldId="2147483648"/>
-              <pc:sldLayoutMk cId="4166362897" sldId="2147483652"/>
-              <ac:spMk id="4" creationId="{0083A11F-EFF1-4410-B9C8-3A28A01CB7C3}"/>
-            </ac:spMkLst>
-          </pc:spChg>
-        </pc:sldLayoutChg>
-        <pc:sldLayoutChg chg="modSp">
-          <pc:chgData name="I Didntdoit" userId="5eebce3a00c84678" providerId="LiveId" clId="{C90EE19E-0B24-44E0-8E69-0500D5924BD1}" dt="2019-04-06T19:33:14.572" v="201"/>
-          <pc:sldLayoutMkLst>
-            <pc:docMk/>
-            <pc:sldMasterMk cId="966135916" sldId="2147483648"/>
-            <pc:sldLayoutMk cId="2766479937" sldId="2147483653"/>
-          </pc:sldLayoutMkLst>
-          <pc:spChg chg="mod">
-            <ac:chgData name="I Didntdoit" userId="5eebce3a00c84678" providerId="LiveId" clId="{C90EE19E-0B24-44E0-8E69-0500D5924BD1}" dt="2019-04-06T19:33:14.572" v="201"/>
-            <ac:spMkLst>
-              <pc:docMk/>
-              <pc:sldMasterMk cId="966135916" sldId="2147483648"/>
-              <pc:sldLayoutMk cId="2766479937" sldId="2147483653"/>
-              <ac:spMk id="2" creationId="{84BF4C8D-1305-49A4-A3BD-A1BBDEB63D5A}"/>
-            </ac:spMkLst>
-          </pc:spChg>
-          <pc:spChg chg="mod">
-            <ac:chgData name="I Didntdoit" userId="5eebce3a00c84678" providerId="LiveId" clId="{C90EE19E-0B24-44E0-8E69-0500D5924BD1}" dt="2019-04-06T19:33:14.572" v="201"/>
-            <ac:spMkLst>
-              <pc:docMk/>
-              <pc:sldMasterMk cId="966135916" sldId="2147483648"/>
-              <pc:sldLayoutMk cId="2766479937" sldId="2147483653"/>
-              <ac:spMk id="3" creationId="{301202D3-9CF4-472C-A299-F09E521BFC67}"/>
-            </ac:spMkLst>
-          </pc:spChg>
-          <pc:spChg chg="mod">
-            <ac:chgData name="I Didntdoit" userId="5eebce3a00c84678" providerId="LiveId" clId="{C90EE19E-0B24-44E0-8E69-0500D5924BD1}" dt="2019-04-06T19:33:14.572" v="201"/>
-            <ac:spMkLst>
-              <pc:docMk/>
-              <pc:sldMasterMk cId="966135916" sldId="2147483648"/>
-              <pc:sldLayoutMk cId="2766479937" sldId="2147483653"/>
-              <ac:spMk id="4" creationId="{E811F48A-FC79-42E1-A950-691F38D7A627}"/>
-            </ac:spMkLst>
-          </pc:spChg>
-          <pc:spChg chg="mod">
-            <ac:chgData name="I Didntdoit" userId="5eebce3a00c84678" providerId="LiveId" clId="{C90EE19E-0B24-44E0-8E69-0500D5924BD1}" dt="2019-04-06T19:33:14.572" v="201"/>
-            <ac:spMkLst>
-              <pc:docMk/>
-              <pc:sldMasterMk cId="966135916" sldId="2147483648"/>
-              <pc:sldLayoutMk cId="2766479937" sldId="2147483653"/>
-              <ac:spMk id="5" creationId="{35083C36-B777-450A-B7C8-C0EA24513FE1}"/>
-            </ac:spMkLst>
-          </pc:spChg>
-          <pc:spChg chg="mod">
-            <ac:chgData name="I Didntdoit" userId="5eebce3a00c84678" providerId="LiveId" clId="{C90EE19E-0B24-44E0-8E69-0500D5924BD1}" dt="2019-04-06T19:33:14.572" v="201"/>
-            <ac:spMkLst>
-              <pc:docMk/>
-              <pc:sldMasterMk cId="966135916" sldId="2147483648"/>
-              <pc:sldLayoutMk cId="2766479937" sldId="2147483653"/>
-              <ac:spMk id="6" creationId="{C694EE34-0C1B-413F-B654-183112379340}"/>
-            </ac:spMkLst>
-          </pc:spChg>
-        </pc:sldLayoutChg>
-        <pc:sldLayoutChg chg="modSp">
-          <pc:chgData name="I Didntdoit" userId="5eebce3a00c84678" providerId="LiveId" clId="{C90EE19E-0B24-44E0-8E69-0500D5924BD1}" dt="2019-04-06T19:33:14.572" v="201"/>
-          <pc:sldLayoutMkLst>
-            <pc:docMk/>
-            <pc:sldMasterMk cId="966135916" sldId="2147483648"/>
-            <pc:sldLayoutMk cId="3178613829" sldId="2147483656"/>
-          </pc:sldLayoutMkLst>
-          <pc:spChg chg="mod">
-            <ac:chgData name="I Didntdoit" userId="5eebce3a00c84678" providerId="LiveId" clId="{C90EE19E-0B24-44E0-8E69-0500D5924BD1}" dt="2019-04-06T19:33:14.572" v="201"/>
-            <ac:spMkLst>
-              <pc:docMk/>
-              <pc:sldMasterMk cId="966135916" sldId="2147483648"/>
-              <pc:sldLayoutMk cId="3178613829" sldId="2147483656"/>
-              <ac:spMk id="2" creationId="{96A12A5D-98CD-4BA0-A03D-3BED60D46D99}"/>
-            </ac:spMkLst>
-          </pc:spChg>
-          <pc:spChg chg="mod">
-            <ac:chgData name="I Didntdoit" userId="5eebce3a00c84678" providerId="LiveId" clId="{C90EE19E-0B24-44E0-8E69-0500D5924BD1}" dt="2019-04-06T19:33:14.572" v="201"/>
-            <ac:spMkLst>
-              <pc:docMk/>
-              <pc:sldMasterMk cId="966135916" sldId="2147483648"/>
-              <pc:sldLayoutMk cId="3178613829" sldId="2147483656"/>
-              <ac:spMk id="3" creationId="{2A5737F4-888B-427B-8A09-D3021E5AB620}"/>
-            </ac:spMkLst>
-          </pc:spChg>
-          <pc:spChg chg="mod">
-            <ac:chgData name="I Didntdoit" userId="5eebce3a00c84678" providerId="LiveId" clId="{C90EE19E-0B24-44E0-8E69-0500D5924BD1}" dt="2019-04-06T19:33:14.572" v="201"/>
-            <ac:spMkLst>
-              <pc:docMk/>
-              <pc:sldMasterMk cId="966135916" sldId="2147483648"/>
-              <pc:sldLayoutMk cId="3178613829" sldId="2147483656"/>
-              <ac:spMk id="4" creationId="{AEC186F4-695D-48BA-AA19-711B75803A06}"/>
-            </ac:spMkLst>
-          </pc:spChg>
-        </pc:sldLayoutChg>
-        <pc:sldLayoutChg chg="modSp">
-          <pc:chgData name="I Didntdoit" userId="5eebce3a00c84678" providerId="LiveId" clId="{C90EE19E-0B24-44E0-8E69-0500D5924BD1}" dt="2019-04-06T19:33:14.572" v="201"/>
-          <pc:sldLayoutMkLst>
-            <pc:docMk/>
-            <pc:sldMasterMk cId="966135916" sldId="2147483648"/>
-            <pc:sldLayoutMk cId="3685864760" sldId="2147483657"/>
-          </pc:sldLayoutMkLst>
-          <pc:spChg chg="mod">
-            <ac:chgData name="I Didntdoit" userId="5eebce3a00c84678" providerId="LiveId" clId="{C90EE19E-0B24-44E0-8E69-0500D5924BD1}" dt="2019-04-06T19:33:14.572" v="201"/>
-            <ac:spMkLst>
-              <pc:docMk/>
-              <pc:sldMasterMk cId="966135916" sldId="2147483648"/>
-              <pc:sldLayoutMk cId="3685864760" sldId="2147483657"/>
-              <ac:spMk id="2" creationId="{DCC2F26C-913F-412C-A921-0CD8E9FD86AA}"/>
-            </ac:spMkLst>
-          </pc:spChg>
-          <pc:spChg chg="mod">
-            <ac:chgData name="I Didntdoit" userId="5eebce3a00c84678" providerId="LiveId" clId="{C90EE19E-0B24-44E0-8E69-0500D5924BD1}" dt="2019-04-06T19:33:14.572" v="201"/>
-            <ac:spMkLst>
-              <pc:docMk/>
-              <pc:sldMasterMk cId="966135916" sldId="2147483648"/>
-              <pc:sldLayoutMk cId="3685864760" sldId="2147483657"/>
-              <ac:spMk id="3" creationId="{6624D1F6-CAE1-43BA-BF12-B30E942A7E0F}"/>
-            </ac:spMkLst>
-          </pc:spChg>
-          <pc:spChg chg="mod">
-            <ac:chgData name="I Didntdoit" userId="5eebce3a00c84678" providerId="LiveId" clId="{C90EE19E-0B24-44E0-8E69-0500D5924BD1}" dt="2019-04-06T19:33:14.572" v="201"/>
-            <ac:spMkLst>
-              <pc:docMk/>
-              <pc:sldMasterMk cId="966135916" sldId="2147483648"/>
-              <pc:sldLayoutMk cId="3685864760" sldId="2147483657"/>
-              <ac:spMk id="4" creationId="{87726838-B3D6-4134-B409-4A4569EF1D1C}"/>
-            </ac:spMkLst>
-          </pc:spChg>
-        </pc:sldLayoutChg>
-        <pc:sldLayoutChg chg="modSp">
-          <pc:chgData name="I Didntdoit" userId="5eebce3a00c84678" providerId="LiveId" clId="{C90EE19E-0B24-44E0-8E69-0500D5924BD1}" dt="2019-04-06T19:33:14.572" v="201"/>
-          <pc:sldLayoutMkLst>
-            <pc:docMk/>
-            <pc:sldMasterMk cId="966135916" sldId="2147483648"/>
-            <pc:sldLayoutMk cId="2402989876" sldId="2147483659"/>
-          </pc:sldLayoutMkLst>
-          <pc:spChg chg="mod">
-            <ac:chgData name="I Didntdoit" userId="5eebce3a00c84678" providerId="LiveId" clId="{C90EE19E-0B24-44E0-8E69-0500D5924BD1}" dt="2019-04-06T19:33:14.572" v="201"/>
-            <ac:spMkLst>
-              <pc:docMk/>
-              <pc:sldMasterMk cId="966135916" sldId="2147483648"/>
-              <pc:sldLayoutMk cId="2402989876" sldId="2147483659"/>
-              <ac:spMk id="2" creationId="{C61F12F2-39C2-47CE-9FF8-21E0646B4711}"/>
-            </ac:spMkLst>
-          </pc:spChg>
-          <pc:spChg chg="mod">
-            <ac:chgData name="I Didntdoit" userId="5eebce3a00c84678" providerId="LiveId" clId="{C90EE19E-0B24-44E0-8E69-0500D5924BD1}" dt="2019-04-06T19:33:14.572" v="201"/>
-            <ac:spMkLst>
-              <pc:docMk/>
-              <pc:sldMasterMk cId="966135916" sldId="2147483648"/>
-              <pc:sldLayoutMk cId="2402989876" sldId="2147483659"/>
-              <ac:spMk id="3" creationId="{6F91CF2E-023C-40EA-9ECD-E28233806038}"/>
-            </ac:spMkLst>
-          </pc:spChg>
-        </pc:sldLayoutChg>
-      </pc:sldMasterChg>
+        <pc:spChg chg="mod">
+          <ac:chgData name="I Didntdoit" userId="5eebce3a00c84678" providerId="LiveId" clId="{C90EE19E-0B24-44E0-8E69-0500D5924BD1}" dt="2019-04-09T15:46:33.251" v="738" actId="1076"/>
+          <ac:spMkLst>
+            <pc:docMk/>
+            <pc:sldMk cId="3931559329" sldId="260"/>
+            <ac:spMk id="45" creationId="{34E93AE4-EF6D-49B5-9FB7-1FC2F15FC376}"/>
+          </ac:spMkLst>
+        </pc:spChg>
+        <pc:spChg chg="del mod">
+          <ac:chgData name="I Didntdoit" userId="5eebce3a00c84678" providerId="LiveId" clId="{C90EE19E-0B24-44E0-8E69-0500D5924BD1}" dt="2019-04-09T15:45:31.972" v="730" actId="478"/>
+          <ac:spMkLst>
+            <pc:docMk/>
+            <pc:sldMk cId="3931559329" sldId="260"/>
+            <ac:spMk id="57" creationId="{6333A6F1-909A-4921-B417-3A5DCB2CBD45}"/>
+          </ac:spMkLst>
+        </pc:spChg>
+        <pc:spChg chg="mod">
+          <ac:chgData name="I Didntdoit" userId="5eebce3a00c84678" providerId="LiveId" clId="{C90EE19E-0B24-44E0-8E69-0500D5924BD1}" dt="2019-04-09T15:49:28.228" v="776" actId="20577"/>
+          <ac:spMkLst>
+            <pc:docMk/>
+            <pc:sldMk cId="3931559329" sldId="260"/>
+            <ac:spMk id="62" creationId="{879BCEE5-DAEF-49E9-A045-DF5C9E1C358C}"/>
+          </ac:spMkLst>
+        </pc:spChg>
+        <pc:spChg chg="mod">
+          <ac:chgData name="I Didntdoit" userId="5eebce3a00c84678" providerId="LiveId" clId="{C90EE19E-0B24-44E0-8E69-0500D5924BD1}" dt="2019-04-09T15:48:29.930" v="762" actId="20577"/>
+          <ac:spMkLst>
+            <pc:docMk/>
+            <pc:sldMk cId="3931559329" sldId="260"/>
+            <ac:spMk id="66" creationId="{42C599B8-2F9B-4FDF-95A7-681082023B5D}"/>
+          </ac:spMkLst>
+        </pc:spChg>
+        <pc:spChg chg="mod">
+          <ac:chgData name="I Didntdoit" userId="5eebce3a00c84678" providerId="LiveId" clId="{C90EE19E-0B24-44E0-8E69-0500D5924BD1}" dt="2019-04-09T15:47:52.162" v="753" actId="1076"/>
+          <ac:spMkLst>
+            <pc:docMk/>
+            <pc:sldMk cId="3931559329" sldId="260"/>
+            <ac:spMk id="72" creationId="{75B1F42C-B0E9-4230-B4B9-9945CF16A1B2}"/>
+          </ac:spMkLst>
+        </pc:spChg>
+        <pc:spChg chg="mod ord">
+          <ac:chgData name="I Didntdoit" userId="5eebce3a00c84678" providerId="LiveId" clId="{C90EE19E-0B24-44E0-8E69-0500D5924BD1}" dt="2019-04-09T15:47:23.854" v="750" actId="1076"/>
+          <ac:spMkLst>
+            <pc:docMk/>
+            <pc:sldMk cId="3931559329" sldId="260"/>
+            <ac:spMk id="74" creationId="{4762169F-58AE-4BD5-9B99-E635300414C1}"/>
+          </ac:spMkLst>
+        </pc:spChg>
+        <pc:spChg chg="mod">
+          <ac:chgData name="I Didntdoit" userId="5eebce3a00c84678" providerId="LiveId" clId="{C90EE19E-0B24-44E0-8E69-0500D5924BD1}" dt="2019-04-09T15:46:33.251" v="738" actId="1076"/>
+          <ac:spMkLst>
+            <pc:docMk/>
+            <pc:sldMk cId="3931559329" sldId="260"/>
+            <ac:spMk id="84" creationId="{87016E8B-1556-48EA-A334-904ED56A19DF}"/>
+          </ac:spMkLst>
+        </pc:spChg>
+        <pc:spChg chg="del mod">
+          <ac:chgData name="I Didntdoit" userId="5eebce3a00c84678" providerId="LiveId" clId="{C90EE19E-0B24-44E0-8E69-0500D5924BD1}" dt="2019-04-09T15:45:29.799" v="728" actId="478"/>
+          <ac:spMkLst>
+            <pc:docMk/>
+            <pc:sldMk cId="3931559329" sldId="260"/>
+            <ac:spMk id="103" creationId="{9668F345-A8D8-430A-8702-610394C8ECFE}"/>
+          </ac:spMkLst>
+        </pc:spChg>
+        <pc:spChg chg="mod">
+          <ac:chgData name="I Didntdoit" userId="5eebce3a00c84678" providerId="LiveId" clId="{C90EE19E-0B24-44E0-8E69-0500D5924BD1}" dt="2019-04-09T15:46:33.251" v="738" actId="1076"/>
+          <ac:spMkLst>
+            <pc:docMk/>
+            <pc:sldMk cId="3931559329" sldId="260"/>
+            <ac:spMk id="104" creationId="{19F67301-B79C-47B0-97BF-27DF34DD58E7}"/>
+          </ac:spMkLst>
+        </pc:spChg>
+        <pc:grpChg chg="mod">
+          <ac:chgData name="I Didntdoit" userId="5eebce3a00c84678" providerId="LiveId" clId="{C90EE19E-0B24-44E0-8E69-0500D5924BD1}" dt="2019-04-09T15:46:33.251" v="738" actId="1076"/>
+          <ac:grpSpMkLst>
+            <pc:docMk/>
+            <pc:sldMk cId="3931559329" sldId="260"/>
+            <ac:grpSpMk id="43" creationId="{BEFB9624-C430-4EC7-BDA6-69494AC4AACC}"/>
+          </ac:grpSpMkLst>
+        </pc:grpChg>
+        <pc:grpChg chg="mod">
+          <ac:chgData name="I Didntdoit" userId="5eebce3a00c84678" providerId="LiveId" clId="{C90EE19E-0B24-44E0-8E69-0500D5924BD1}" dt="2019-04-09T15:46:33.251" v="738" actId="1076"/>
+          <ac:grpSpMkLst>
+            <pc:docMk/>
+            <pc:sldMk cId="3931559329" sldId="260"/>
+            <ac:grpSpMk id="58" creationId="{834E7F82-E7AC-458D-8A6C-64F5398DCD66}"/>
+          </ac:grpSpMkLst>
+        </pc:grpChg>
+        <pc:grpChg chg="mod">
+          <ac:chgData name="I Didntdoit" userId="5eebce3a00c84678" providerId="LiveId" clId="{C90EE19E-0B24-44E0-8E69-0500D5924BD1}" dt="2019-04-09T15:46:33.251" v="738" actId="1076"/>
+          <ac:grpSpMkLst>
+            <pc:docMk/>
+            <pc:sldMk cId="3931559329" sldId="260"/>
+            <ac:grpSpMk id="68" creationId="{AF14C970-0F83-4EDC-B0BF-2022A7CB1A28}"/>
+          </ac:grpSpMkLst>
+        </pc:grpChg>
+        <pc:grpChg chg="del">
+          <ac:chgData name="I Didntdoit" userId="5eebce3a00c84678" providerId="LiveId" clId="{C90EE19E-0B24-44E0-8E69-0500D5924BD1}" dt="2019-04-09T15:43:13.342" v="691" actId="478"/>
+          <ac:grpSpMkLst>
+            <pc:docMk/>
+            <pc:sldMk cId="3931559329" sldId="260"/>
+            <ac:grpSpMk id="69" creationId="{F2CFAF70-375F-4E26-BAA7-FE6A91A2A7EB}"/>
+          </ac:grpSpMkLst>
+        </pc:grpChg>
+        <pc:grpChg chg="mod">
+          <ac:chgData name="I Didntdoit" userId="5eebce3a00c84678" providerId="LiveId" clId="{C90EE19E-0B24-44E0-8E69-0500D5924BD1}" dt="2019-04-09T15:46:33.251" v="738" actId="1076"/>
+          <ac:grpSpMkLst>
+            <pc:docMk/>
+            <pc:sldMk cId="3931559329" sldId="260"/>
+            <ac:grpSpMk id="71" creationId="{FFD6BFE5-6418-4B1F-B90C-E3E270479D4B}"/>
+          </ac:grpSpMkLst>
+        </pc:grpChg>
+        <pc:grpChg chg="del mod">
+          <ac:chgData name="I Didntdoit" userId="5eebce3a00c84678" providerId="LiveId" clId="{C90EE19E-0B24-44E0-8E69-0500D5924BD1}" dt="2019-04-09T15:45:46.239" v="733" actId="478"/>
+          <ac:grpSpMkLst>
+            <pc:docMk/>
+            <pc:sldMk cId="3931559329" sldId="260"/>
+            <ac:grpSpMk id="76" creationId="{01AD0561-B558-407A-B111-E8775261F9B5}"/>
+          </ac:grpSpMkLst>
+        </pc:grpChg>
+        <pc:cxnChg chg="mod">
+          <ac:chgData name="I Didntdoit" userId="5eebce3a00c84678" providerId="LiveId" clId="{C90EE19E-0B24-44E0-8E69-0500D5924BD1}" dt="2019-04-09T15:46:33.251" v="738" actId="1076"/>
+          <ac:cxnSpMkLst>
+            <pc:docMk/>
+            <pc:sldMk cId="3931559329" sldId="260"/>
+            <ac:cxnSpMk id="6" creationId="{112616AF-3B15-4044-821F-3362FF98A7D7}"/>
+          </ac:cxnSpMkLst>
+        </pc:cxnChg>
+        <pc:cxnChg chg="mod">
+          <ac:chgData name="I Didntdoit" userId="5eebce3a00c84678" providerId="LiveId" clId="{C90EE19E-0B24-44E0-8E69-0500D5924BD1}" dt="2019-04-09T15:46:33.251" v="738" actId="1076"/>
+          <ac:cxnSpMkLst>
+            <pc:docMk/>
+            <pc:sldMk cId="3931559329" sldId="260"/>
+            <ac:cxnSpMk id="10" creationId="{51AB43CD-8A0A-46BA-B5B8-34D071CBD4B4}"/>
+          </ac:cxnSpMkLst>
+        </pc:cxnChg>
+        <pc:cxnChg chg="mod">
+          <ac:chgData name="I Didntdoit" userId="5eebce3a00c84678" providerId="LiveId" clId="{C90EE19E-0B24-44E0-8E69-0500D5924BD1}" dt="2019-04-09T15:47:01.282" v="746" actId="14100"/>
+          <ac:cxnSpMkLst>
+            <pc:docMk/>
+            <pc:sldMk cId="3931559329" sldId="260"/>
+            <ac:cxnSpMk id="13" creationId="{3744FB7D-4D46-4B08-A423-E8F4DFD503A8}"/>
+          </ac:cxnSpMkLst>
+        </pc:cxnChg>
+        <pc:cxnChg chg="mod">
+          <ac:chgData name="I Didntdoit" userId="5eebce3a00c84678" providerId="LiveId" clId="{C90EE19E-0B24-44E0-8E69-0500D5924BD1}" dt="2019-04-09T15:46:33.251" v="738" actId="1076"/>
+          <ac:cxnSpMkLst>
+            <pc:docMk/>
+            <pc:sldMk cId="3931559329" sldId="260"/>
+            <ac:cxnSpMk id="19" creationId="{480A16E3-E983-45EB-AB8C-3CEEF2D2B4DA}"/>
+          </ac:cxnSpMkLst>
+        </pc:cxnChg>
+        <pc:cxnChg chg="mod">
+          <ac:chgData name="I Didntdoit" userId="5eebce3a00c84678" providerId="LiveId" clId="{C90EE19E-0B24-44E0-8E69-0500D5924BD1}" dt="2019-04-09T15:46:33.251" v="738" actId="1076"/>
+          <ac:cxnSpMkLst>
+            <pc:docMk/>
+            <pc:sldMk cId="3931559329" sldId="260"/>
+            <ac:cxnSpMk id="22" creationId="{D0A1946F-F14D-4545-8DEC-05C001FDB7D7}"/>
+          </ac:cxnSpMkLst>
+        </pc:cxnChg>
+        <pc:cxnChg chg="del mod">
+          <ac:chgData name="I Didntdoit" userId="5eebce3a00c84678" providerId="LiveId" clId="{C90EE19E-0B24-44E0-8E69-0500D5924BD1}" dt="2019-04-09T15:45:30.682" v="729" actId="478"/>
+          <ac:cxnSpMkLst>
+            <pc:docMk/>
+            <pc:sldMk cId="3931559329" sldId="260"/>
+            <ac:cxnSpMk id="36" creationId="{657012C4-8113-4D40-B3DA-286B389C32C5}"/>
+          </ac:cxnSpMkLst>
+        </pc:cxnChg>
+        <pc:cxnChg chg="mod">
+          <ac:chgData name="I Didntdoit" userId="5eebce3a00c84678" providerId="LiveId" clId="{C90EE19E-0B24-44E0-8E69-0500D5924BD1}" dt="2019-04-09T15:46:33.251" v="738" actId="1076"/>
+          <ac:cxnSpMkLst>
+            <pc:docMk/>
+            <pc:sldMk cId="3931559329" sldId="260"/>
+            <ac:cxnSpMk id="41" creationId="{C675EF59-6BB0-49E9-BBA0-0C4F7EA1A280}"/>
+          </ac:cxnSpMkLst>
+        </pc:cxnChg>
+        <pc:cxnChg chg="mod">
+          <ac:chgData name="I Didntdoit" userId="5eebce3a00c84678" providerId="LiveId" clId="{C90EE19E-0B24-44E0-8E69-0500D5924BD1}" dt="2019-04-09T15:46:33.251" v="738" actId="1076"/>
+          <ac:cxnSpMkLst>
+            <pc:docMk/>
+            <pc:sldMk cId="3931559329" sldId="260"/>
+            <ac:cxnSpMk id="52" creationId="{FB7B5AE8-BAA3-48C9-A334-85027489CE01}"/>
+          </ac:cxnSpMkLst>
+        </pc:cxnChg>
+        <pc:cxnChg chg="del mod">
+          <ac:chgData name="I Didntdoit" userId="5eebce3a00c84678" providerId="LiveId" clId="{C90EE19E-0B24-44E0-8E69-0500D5924BD1}" dt="2019-04-09T15:44:57.159" v="706" actId="478"/>
+          <ac:cxnSpMkLst>
+            <pc:docMk/>
+            <pc:sldMk cId="3931559329" sldId="260"/>
+            <ac:cxnSpMk id="56" creationId="{F6E504B6-8D5D-4789-9362-9129FA3F2C3B}"/>
+          </ac:cxnSpMkLst>
+        </pc:cxnChg>
+        <pc:cxnChg chg="mod">
+          <ac:chgData name="I Didntdoit" userId="5eebce3a00c84678" providerId="LiveId" clId="{C90EE19E-0B24-44E0-8E69-0500D5924BD1}" dt="2019-04-09T15:46:33.251" v="738" actId="1076"/>
+          <ac:cxnSpMkLst>
+            <pc:docMk/>
+            <pc:sldMk cId="3931559329" sldId="260"/>
+            <ac:cxnSpMk id="60" creationId="{504F5569-CAE0-4D51-85DD-681CCD983651}"/>
+          </ac:cxnSpMkLst>
+        </pc:cxnChg>
+        <pc:cxnChg chg="mod">
+          <ac:chgData name="I Didntdoit" userId="5eebce3a00c84678" providerId="LiveId" clId="{C90EE19E-0B24-44E0-8E69-0500D5924BD1}" dt="2019-04-09T15:46:33.251" v="738" actId="1076"/>
+          <ac:cxnSpMkLst>
+            <pc:docMk/>
+            <pc:sldMk cId="3931559329" sldId="260"/>
+            <ac:cxnSpMk id="64" creationId="{41CCF889-5796-4721-9FB6-7898EDD3C46A}"/>
+          </ac:cxnSpMkLst>
+        </pc:cxnChg>
+        <pc:cxnChg chg="del mod">
+          <ac:chgData name="I Didntdoit" userId="5eebce3a00c84678" providerId="LiveId" clId="{C90EE19E-0B24-44E0-8E69-0500D5924BD1}" dt="2019-04-09T15:45:25.829" v="725" actId="478"/>
+          <ac:cxnSpMkLst>
+            <pc:docMk/>
+            <pc:sldMk cId="3931559329" sldId="260"/>
+            <ac:cxnSpMk id="65" creationId="{A8D0F15B-015C-4B51-BFE0-F9CFBDB9461D}"/>
+          </ac:cxnSpMkLst>
+        </pc:cxnChg>
+        <pc:cxnChg chg="del mod">
+          <ac:chgData name="I Didntdoit" userId="5eebce3a00c84678" providerId="LiveId" clId="{C90EE19E-0B24-44E0-8E69-0500D5924BD1}" dt="2019-04-09T15:46:43.141" v="741" actId="478"/>
+          <ac:cxnSpMkLst>
+            <pc:docMk/>
+            <pc:sldMk cId="3931559329" sldId="260"/>
+            <ac:cxnSpMk id="75" creationId="{E8D1CBC4-D681-4EA7-82EE-F042E79E6E29}"/>
+          </ac:cxnSpMkLst>
+        </pc:cxnChg>
+        <pc:cxnChg chg="del mod">
+          <ac:chgData name="I Didntdoit" userId="5eebce3a00c84678" providerId="LiveId" clId="{C90EE19E-0B24-44E0-8E69-0500D5924BD1}" dt="2019-04-09T15:45:46.996" v="734" actId="478"/>
+          <ac:cxnSpMkLst>
+            <pc:docMk/>
+            <pc:sldMk cId="3931559329" sldId="260"/>
+            <ac:cxnSpMk id="82" creationId="{E161A616-10C1-4935-9A8F-2072FAD050CC}"/>
+          </ac:cxnSpMkLst>
+        </pc:cxnChg>
+        <pc:cxnChg chg="del mod">
+          <ac:chgData name="I Didntdoit" userId="5eebce3a00c84678" providerId="LiveId" clId="{C90EE19E-0B24-44E0-8E69-0500D5924BD1}" dt="2019-04-09T15:45:27.059" v="726" actId="478"/>
+          <ac:cxnSpMkLst>
+            <pc:docMk/>
+            <pc:sldMk cId="3931559329" sldId="260"/>
+            <ac:cxnSpMk id="83" creationId="{B72393CC-C67D-4784-905B-E47FEA773793}"/>
+          </ac:cxnSpMkLst>
+        </pc:cxnChg>
+        <pc:cxnChg chg="add mod">
+          <ac:chgData name="I Didntdoit" userId="5eebce3a00c84678" providerId="LiveId" clId="{C90EE19E-0B24-44E0-8E69-0500D5924BD1}" dt="2019-04-09T15:46:49.330" v="744" actId="14100"/>
+          <ac:cxnSpMkLst>
+            <pc:docMk/>
+            <pc:sldMk cId="3931559329" sldId="260"/>
+            <ac:cxnSpMk id="85" creationId="{157E1C74-E4F7-41BA-8A8F-2FAC42184E09}"/>
+          </ac:cxnSpMkLst>
+        </pc:cxnChg>
+        <pc:cxnChg chg="mod">
+          <ac:chgData name="I Didntdoit" userId="5eebce3a00c84678" providerId="LiveId" clId="{C90EE19E-0B24-44E0-8E69-0500D5924BD1}" dt="2019-04-09T15:46:33.251" v="738" actId="1076"/>
+          <ac:cxnSpMkLst>
+            <pc:docMk/>
+            <pc:sldMk cId="3931559329" sldId="260"/>
+            <ac:cxnSpMk id="96" creationId="{84F059B9-4325-480B-860A-B132AD2D72F1}"/>
+          </ac:cxnSpMkLst>
+        </pc:cxnChg>
+      </pc:sldChg>
     </pc:docChg>
   </pc:docChgLst>
 </pc:chgInfo>
@@ -1689,7 +1496,7 @@
           <a:p>
             <a:fld id="{FB799517-DE48-486B-9905-8D8C9A6A5E6A}" type="datetimeFigureOut">
               <a:rPr lang="de-DE" smtClean="0"/>
-              <a:t>06.04.2019</a:t>
+              <a:t>09.04.2019</a:t>
             </a:fld>
             <a:endParaRPr lang="de-DE"/>
           </a:p>
@@ -1859,7 +1666,7 @@
           <a:p>
             <a:fld id="{FB799517-DE48-486B-9905-8D8C9A6A5E6A}" type="datetimeFigureOut">
               <a:rPr lang="de-DE" smtClean="0"/>
-              <a:t>06.04.2019</a:t>
+              <a:t>09.04.2019</a:t>
             </a:fld>
             <a:endParaRPr lang="de-DE"/>
           </a:p>
@@ -2039,7 +1846,7 @@
           <a:p>
             <a:fld id="{FB799517-DE48-486B-9905-8D8C9A6A5E6A}" type="datetimeFigureOut">
               <a:rPr lang="de-DE" smtClean="0"/>
-              <a:t>06.04.2019</a:t>
+              <a:t>09.04.2019</a:t>
             </a:fld>
             <a:endParaRPr lang="de-DE"/>
           </a:p>
@@ -2209,7 +2016,7 @@
           <a:p>
             <a:fld id="{FB799517-DE48-486B-9905-8D8C9A6A5E6A}" type="datetimeFigureOut">
               <a:rPr lang="de-DE" smtClean="0"/>
-              <a:t>06.04.2019</a:t>
+              <a:t>09.04.2019</a:t>
             </a:fld>
             <a:endParaRPr lang="de-DE"/>
           </a:p>
@@ -2455,7 +2262,7 @@
           <a:p>
             <a:fld id="{FB799517-DE48-486B-9905-8D8C9A6A5E6A}" type="datetimeFigureOut">
               <a:rPr lang="de-DE" smtClean="0"/>
-              <a:t>06.04.2019</a:t>
+              <a:t>09.04.2019</a:t>
             </a:fld>
             <a:endParaRPr lang="de-DE"/>
           </a:p>
@@ -2687,7 +2494,7 @@
           <a:p>
             <a:fld id="{FB799517-DE48-486B-9905-8D8C9A6A5E6A}" type="datetimeFigureOut">
               <a:rPr lang="de-DE" smtClean="0"/>
-              <a:t>06.04.2019</a:t>
+              <a:t>09.04.2019</a:t>
             </a:fld>
             <a:endParaRPr lang="de-DE"/>
           </a:p>
@@ -3054,7 +2861,7 @@
           <a:p>
             <a:fld id="{FB799517-DE48-486B-9905-8D8C9A6A5E6A}" type="datetimeFigureOut">
               <a:rPr lang="de-DE" smtClean="0"/>
-              <a:t>06.04.2019</a:t>
+              <a:t>09.04.2019</a:t>
             </a:fld>
             <a:endParaRPr lang="de-DE"/>
           </a:p>
@@ -3172,7 +2979,7 @@
           <a:p>
             <a:fld id="{FB799517-DE48-486B-9905-8D8C9A6A5E6A}" type="datetimeFigureOut">
               <a:rPr lang="de-DE" smtClean="0"/>
-              <a:t>06.04.2019</a:t>
+              <a:t>09.04.2019</a:t>
             </a:fld>
             <a:endParaRPr lang="de-DE"/>
           </a:p>
@@ -3267,7 +3074,7 @@
           <a:p>
             <a:fld id="{FB799517-DE48-486B-9905-8D8C9A6A5E6A}" type="datetimeFigureOut">
               <a:rPr lang="de-DE" smtClean="0"/>
-              <a:t>06.04.2019</a:t>
+              <a:t>09.04.2019</a:t>
             </a:fld>
             <a:endParaRPr lang="de-DE"/>
           </a:p>
@@ -3544,7 +3351,7 @@
           <a:p>
             <a:fld id="{FB799517-DE48-486B-9905-8D8C9A6A5E6A}" type="datetimeFigureOut">
               <a:rPr lang="de-DE" smtClean="0"/>
-              <a:t>06.04.2019</a:t>
+              <a:t>09.04.2019</a:t>
             </a:fld>
             <a:endParaRPr lang="de-DE"/>
           </a:p>
@@ -3801,7 +3608,7 @@
           <a:p>
             <a:fld id="{FB799517-DE48-486B-9905-8D8C9A6A5E6A}" type="datetimeFigureOut">
               <a:rPr lang="de-DE" smtClean="0"/>
-              <a:t>06.04.2019</a:t>
+              <a:t>09.04.2019</a:t>
             </a:fld>
             <a:endParaRPr lang="de-DE"/>
           </a:p>
@@ -4014,7 +3821,7 @@
           <a:p>
             <a:fld id="{FB799517-DE48-486B-9905-8D8C9A6A5E6A}" type="datetimeFigureOut">
               <a:rPr lang="de-DE" smtClean="0"/>
-              <a:t>06.04.2019</a:t>
+              <a:t>09.04.2019</a:t>
             </a:fld>
             <a:endParaRPr lang="de-DE"/>
           </a:p>
@@ -5265,7 +5072,7 @@
 </file>
 
 <file path=ppt/slides/slide2.xml><?xml version="1.0" encoding="utf-8"?>
-<p:sld xmlns:a="http://schemas.openxmlformats.org/drawingml/2006/main" xmlns:r="http://schemas.openxmlformats.org/officeDocument/2006/relationships" xmlns:p="http://schemas.openxmlformats.org/presentationml/2006/main">
+<p:sld xmlns:a="http://schemas.openxmlformats.org/drawingml/2006/main" xmlns:r="http://schemas.openxmlformats.org/officeDocument/2006/relationships" xmlns:p="http://schemas.openxmlformats.org/presentationml/2006/main" show="0">
   <p:cSld>
     <p:spTree>
       <p:nvGrpSpPr>
@@ -7831,6 +7638,1717 @@
       </p:grpSpPr>
       <p:sp>
         <p:nvSpPr>
+          <p:cNvPr id="74" name="Textfeld 73">
+            <a:extLst>
+              <a:ext uri="{FF2B5EF4-FFF2-40B4-BE49-F238E27FC236}">
+                <a16:creationId xmlns:a16="http://schemas.microsoft.com/office/drawing/2014/main" id="{4762169F-58AE-4BD5-9B99-E635300414C1}"/>
+              </a:ext>
+            </a:extLst>
+          </p:cNvPr>
+          <p:cNvSpPr txBox="1"/>
+          <p:nvPr/>
+        </p:nvSpPr>
+        <p:spPr>
+          <a:xfrm>
+            <a:off x="963172" y="2941320"/>
+            <a:ext cx="399199" cy="241980"/>
+          </a:xfrm>
+          <a:prstGeom prst="rect">
+            <a:avLst/>
+          </a:prstGeom>
+          <a:solidFill>
+            <a:schemeClr val="bg1"/>
+          </a:solidFill>
+        </p:spPr>
+        <p:txBody>
+          <a:bodyPr wrap="none" lIns="54000" tIns="36000" rIns="54000" bIns="36000" rtlCol="0">
+            <a:spAutoFit/>
+          </a:bodyPr>
+          <a:lstStyle/>
+          <a:p>
+            <a:pPr algn="r"/>
+            <a:r>
+              <a:rPr lang="de-DE" sz="1100" dirty="0" err="1"/>
+              <a:t>drive</a:t>
+            </a:r>
+            <a:endParaRPr lang="de-DE" sz="1100" dirty="0"/>
+          </a:p>
+        </p:txBody>
+      </p:sp>
+      <p:sp>
+        <p:nvSpPr>
+          <p:cNvPr id="12" name="Rechteck 11">
+            <a:extLst>
+              <a:ext uri="{FF2B5EF4-FFF2-40B4-BE49-F238E27FC236}">
+                <a16:creationId xmlns:a16="http://schemas.microsoft.com/office/drawing/2014/main" id="{A0289756-56F0-4257-B9DB-2D9C892B4F2A}"/>
+              </a:ext>
+            </a:extLst>
+          </p:cNvPr>
+          <p:cNvSpPr/>
+          <p:nvPr/>
+        </p:nvSpPr>
+        <p:spPr>
+          <a:xfrm>
+            <a:off x="1800332" y="1079880"/>
+            <a:ext cx="8640000" cy="4320001"/>
+          </a:xfrm>
+          <a:prstGeom prst="rect">
+            <a:avLst/>
+          </a:prstGeom>
+          <a:noFill/>
+          <a:ln>
+            <a:solidFill>
+              <a:schemeClr val="tx1"/>
+            </a:solidFill>
+            <a:prstDash val="dash"/>
+          </a:ln>
+        </p:spPr>
+        <p:style>
+          <a:lnRef idx="2">
+            <a:schemeClr val="accent1">
+              <a:shade val="50000"/>
+            </a:schemeClr>
+          </a:lnRef>
+          <a:fillRef idx="1">
+            <a:schemeClr val="accent1"/>
+          </a:fillRef>
+          <a:effectRef idx="0">
+            <a:schemeClr val="accent1"/>
+          </a:effectRef>
+          <a:fontRef idx="minor">
+            <a:schemeClr val="lt1"/>
+          </a:fontRef>
+        </p:style>
+        <p:txBody>
+          <a:bodyPr rtlCol="0" anchor="ctr"/>
+          <a:lstStyle/>
+          <a:p>
+            <a:pPr algn="ctr"/>
+            <a:endParaRPr lang="de-DE"/>
+          </a:p>
+        </p:txBody>
+      </p:sp>
+      <p:cxnSp>
+        <p:nvCxnSpPr>
+          <p:cNvPr id="6" name="Gerade Verbindung mit Pfeil 5">
+            <a:extLst>
+              <a:ext uri="{FF2B5EF4-FFF2-40B4-BE49-F238E27FC236}">
+                <a16:creationId xmlns:a16="http://schemas.microsoft.com/office/drawing/2014/main" id="{112616AF-3B15-4044-821F-3362FF98A7D7}"/>
+              </a:ext>
+            </a:extLst>
+          </p:cNvPr>
+          <p:cNvCxnSpPr>
+            <a:cxnSpLocks/>
+            <a:stCxn id="44" idx="3"/>
+            <a:endCxn id="8" idx="1"/>
+          </p:cNvCxnSpPr>
+          <p:nvPr/>
+        </p:nvCxnSpPr>
+        <p:spPr>
+          <a:xfrm>
+            <a:off x="3960331" y="2879881"/>
+            <a:ext cx="1437607" cy="4824"/>
+          </a:xfrm>
+          <a:prstGeom prst="straightConnector1">
+            <a:avLst/>
+          </a:prstGeom>
+          <a:ln w="19050">
+            <a:solidFill>
+              <a:schemeClr val="tx1"/>
+            </a:solidFill>
+            <a:tailEnd type="triangle"/>
+          </a:ln>
+        </p:spPr>
+        <p:style>
+          <a:lnRef idx="1">
+            <a:schemeClr val="accent1"/>
+          </a:lnRef>
+          <a:fillRef idx="0">
+            <a:schemeClr val="accent1"/>
+          </a:fillRef>
+          <a:effectRef idx="0">
+            <a:schemeClr val="accent1"/>
+          </a:effectRef>
+          <a:fontRef idx="minor">
+            <a:schemeClr val="tx1"/>
+          </a:fontRef>
+        </p:style>
+      </p:cxnSp>
+      <p:cxnSp>
+        <p:nvCxnSpPr>
+          <p:cNvPr id="10" name="Gerade Verbindung mit Pfeil 9">
+            <a:extLst>
+              <a:ext uri="{FF2B5EF4-FFF2-40B4-BE49-F238E27FC236}">
+                <a16:creationId xmlns:a16="http://schemas.microsoft.com/office/drawing/2014/main" id="{51AB43CD-8A0A-46BA-B5B8-34D071CBD4B4}"/>
+              </a:ext>
+            </a:extLst>
+          </p:cNvPr>
+          <p:cNvCxnSpPr>
+            <a:cxnSpLocks/>
+            <a:stCxn id="11" idx="3"/>
+            <a:endCxn id="66" idx="1"/>
+          </p:cNvCxnSpPr>
+          <p:nvPr/>
+        </p:nvCxnSpPr>
+        <p:spPr>
+          <a:xfrm>
+            <a:off x="5164187" y="3234120"/>
+            <a:ext cx="233749" cy="0"/>
+          </a:xfrm>
+          <a:prstGeom prst="straightConnector1">
+            <a:avLst/>
+          </a:prstGeom>
+          <a:ln w="19050">
+            <a:solidFill>
+              <a:schemeClr val="tx1"/>
+            </a:solidFill>
+            <a:tailEnd type="triangle"/>
+          </a:ln>
+        </p:spPr>
+        <p:style>
+          <a:lnRef idx="1">
+            <a:schemeClr val="accent1"/>
+          </a:lnRef>
+          <a:fillRef idx="0">
+            <a:schemeClr val="accent1"/>
+          </a:fillRef>
+          <a:effectRef idx="0">
+            <a:schemeClr val="accent1"/>
+          </a:effectRef>
+          <a:fontRef idx="minor">
+            <a:schemeClr val="tx1"/>
+          </a:fontRef>
+        </p:style>
+      </p:cxnSp>
+      <p:sp>
+        <p:nvSpPr>
+          <p:cNvPr id="11" name="Textfeld 10">
+            <a:extLst>
+              <a:ext uri="{FF2B5EF4-FFF2-40B4-BE49-F238E27FC236}">
+                <a16:creationId xmlns:a16="http://schemas.microsoft.com/office/drawing/2014/main" id="{CA18DB35-6FF7-45C5-8D81-1704AC7F3931}"/>
+              </a:ext>
+            </a:extLst>
+          </p:cNvPr>
+          <p:cNvSpPr txBox="1"/>
+          <p:nvPr/>
+        </p:nvSpPr>
+        <p:spPr>
+          <a:xfrm>
+            <a:off x="4910861" y="3128518"/>
+            <a:ext cx="253326" cy="211203"/>
+          </a:xfrm>
+          <a:prstGeom prst="rect">
+            <a:avLst/>
+          </a:prstGeom>
+          <a:solidFill>
+            <a:schemeClr val="bg1"/>
+          </a:solidFill>
+        </p:spPr>
+        <p:txBody>
+          <a:bodyPr wrap="none" lIns="54000" tIns="36000" rIns="54000" bIns="36000" rtlCol="0">
+            <a:spAutoFit/>
+          </a:bodyPr>
+          <a:lstStyle/>
+          <a:p>
+            <a:pPr algn="r"/>
+            <a:r>
+              <a:rPr lang="de-DE" sz="900" dirty="0"/>
+              <a:t>0.7</a:t>
+            </a:r>
+          </a:p>
+        </p:txBody>
+      </p:sp>
+      <p:cxnSp>
+        <p:nvCxnSpPr>
+          <p:cNvPr id="13" name="Gerade Verbindung mit Pfeil 12">
+            <a:extLst>
+              <a:ext uri="{FF2B5EF4-FFF2-40B4-BE49-F238E27FC236}">
+                <a16:creationId xmlns:a16="http://schemas.microsoft.com/office/drawing/2014/main" id="{3744FB7D-4D46-4B08-A423-E8F4DFD503A8}"/>
+              </a:ext>
+            </a:extLst>
+          </p:cNvPr>
+          <p:cNvCxnSpPr>
+            <a:cxnSpLocks/>
+            <a:endCxn id="49" idx="1"/>
+          </p:cNvCxnSpPr>
+          <p:nvPr/>
+        </p:nvCxnSpPr>
+        <p:spPr>
+          <a:xfrm>
+            <a:off x="1440043" y="2694407"/>
+            <a:ext cx="1075004" cy="3009"/>
+          </a:xfrm>
+          <a:prstGeom prst="straightConnector1">
+            <a:avLst/>
+          </a:prstGeom>
+          <a:ln w="19050" cap="flat">
+            <a:solidFill>
+              <a:schemeClr val="tx1"/>
+            </a:solidFill>
+            <a:headEnd type="oval" w="med" len="med"/>
+            <a:tailEnd type="triangle"/>
+          </a:ln>
+        </p:spPr>
+        <p:style>
+          <a:lnRef idx="1">
+            <a:schemeClr val="accent1"/>
+          </a:lnRef>
+          <a:fillRef idx="0">
+            <a:schemeClr val="accent1"/>
+          </a:fillRef>
+          <a:effectRef idx="0">
+            <a:schemeClr val="accent1"/>
+          </a:effectRef>
+          <a:fontRef idx="minor">
+            <a:schemeClr val="tx1"/>
+          </a:fontRef>
+        </p:style>
+      </p:cxnSp>
+      <p:sp>
+        <p:nvSpPr>
+          <p:cNvPr id="14" name="Textfeld 13">
+            <a:extLst>
+              <a:ext uri="{FF2B5EF4-FFF2-40B4-BE49-F238E27FC236}">
+                <a16:creationId xmlns:a16="http://schemas.microsoft.com/office/drawing/2014/main" id="{262C1556-A3F6-4075-A5D7-ABB00A050D7A}"/>
+              </a:ext>
+            </a:extLst>
+          </p:cNvPr>
+          <p:cNvSpPr txBox="1"/>
+          <p:nvPr/>
+        </p:nvSpPr>
+        <p:spPr>
+          <a:xfrm>
+            <a:off x="958364" y="2576426"/>
+            <a:ext cx="408817" cy="241980"/>
+          </a:xfrm>
+          <a:prstGeom prst="rect">
+            <a:avLst/>
+          </a:prstGeom>
+          <a:solidFill>
+            <a:schemeClr val="bg1"/>
+          </a:solidFill>
+        </p:spPr>
+        <p:txBody>
+          <a:bodyPr wrap="none" lIns="54000" tIns="36000" rIns="54000" bIns="36000" rtlCol="0">
+            <a:spAutoFit/>
+          </a:bodyPr>
+          <a:lstStyle/>
+          <a:p>
+            <a:pPr algn="r"/>
+            <a:r>
+              <a:rPr lang="de-DE" sz="1100" dirty="0" err="1"/>
+              <a:t>input</a:t>
+            </a:r>
+            <a:endParaRPr lang="de-DE" sz="1100" dirty="0"/>
+          </a:p>
+        </p:txBody>
+      </p:sp>
+      <p:cxnSp>
+        <p:nvCxnSpPr>
+          <p:cNvPr id="19" name="Gerade Verbindung mit Pfeil 18">
+            <a:extLst>
+              <a:ext uri="{FF2B5EF4-FFF2-40B4-BE49-F238E27FC236}">
+                <a16:creationId xmlns:a16="http://schemas.microsoft.com/office/drawing/2014/main" id="{480A16E3-E983-45EB-AB8C-3CEEF2D2B4DA}"/>
+              </a:ext>
+            </a:extLst>
+          </p:cNvPr>
+          <p:cNvCxnSpPr>
+            <a:cxnSpLocks/>
+            <a:stCxn id="20" idx="3"/>
+          </p:cNvCxnSpPr>
+          <p:nvPr/>
+        </p:nvCxnSpPr>
+        <p:spPr>
+          <a:xfrm>
+            <a:off x="5167200" y="4682205"/>
+            <a:ext cx="235552" cy="0"/>
+          </a:xfrm>
+          <a:prstGeom prst="straightConnector1">
+            <a:avLst/>
+          </a:prstGeom>
+          <a:ln w="19050">
+            <a:solidFill>
+              <a:schemeClr val="tx1"/>
+            </a:solidFill>
+            <a:tailEnd type="triangle"/>
+          </a:ln>
+        </p:spPr>
+        <p:style>
+          <a:lnRef idx="1">
+            <a:schemeClr val="accent1"/>
+          </a:lnRef>
+          <a:fillRef idx="0">
+            <a:schemeClr val="accent1"/>
+          </a:fillRef>
+          <a:effectRef idx="0">
+            <a:schemeClr val="accent1"/>
+          </a:effectRef>
+          <a:fontRef idx="minor">
+            <a:schemeClr val="tx1"/>
+          </a:fontRef>
+        </p:style>
+      </p:cxnSp>
+      <p:sp>
+        <p:nvSpPr>
+          <p:cNvPr id="20" name="Textfeld 19">
+            <a:extLst>
+              <a:ext uri="{FF2B5EF4-FFF2-40B4-BE49-F238E27FC236}">
+                <a16:creationId xmlns:a16="http://schemas.microsoft.com/office/drawing/2014/main" id="{72EF9F16-3BEB-41F2-BEBB-33F2ED35CBD2}"/>
+              </a:ext>
+            </a:extLst>
+          </p:cNvPr>
+          <p:cNvSpPr txBox="1"/>
+          <p:nvPr/>
+        </p:nvSpPr>
+        <p:spPr>
+          <a:xfrm>
+            <a:off x="4740751" y="4576603"/>
+            <a:ext cx="426449" cy="211203"/>
+          </a:xfrm>
+          <a:prstGeom prst="rect">
+            <a:avLst/>
+          </a:prstGeom>
+          <a:solidFill>
+            <a:schemeClr val="bg1"/>
+          </a:solidFill>
+        </p:spPr>
+        <p:txBody>
+          <a:bodyPr wrap="none" lIns="54000" tIns="36000" rIns="54000" bIns="36000" rtlCol="0">
+            <a:spAutoFit/>
+          </a:bodyPr>
+          <a:lstStyle/>
+          <a:p>
+            <a:pPr algn="r"/>
+            <a:r>
+              <a:rPr lang="de-DE" sz="900" dirty="0"/>
+              <a:t>8000.0</a:t>
+            </a:r>
+          </a:p>
+        </p:txBody>
+      </p:sp>
+      <p:cxnSp>
+        <p:nvCxnSpPr>
+          <p:cNvPr id="22" name="Verbinder: gewinkelt 21">
+            <a:extLst>
+              <a:ext uri="{FF2B5EF4-FFF2-40B4-BE49-F238E27FC236}">
+                <a16:creationId xmlns:a16="http://schemas.microsoft.com/office/drawing/2014/main" id="{D0A1946F-F14D-4545-8DEC-05C001FDB7D7}"/>
+              </a:ext>
+            </a:extLst>
+          </p:cNvPr>
+          <p:cNvCxnSpPr>
+            <a:cxnSpLocks/>
+          </p:cNvCxnSpPr>
+          <p:nvPr/>
+        </p:nvCxnSpPr>
+        <p:spPr>
+          <a:xfrm rot="16200000" flipH="1">
+            <a:off x="4233380" y="3155286"/>
+            <a:ext cx="1439963" cy="889153"/>
+          </a:xfrm>
+          <a:prstGeom prst="bentConnector2">
+            <a:avLst/>
+          </a:prstGeom>
+          <a:ln w="19050">
+            <a:solidFill>
+              <a:schemeClr val="tx1"/>
+            </a:solidFill>
+            <a:headEnd type="oval" w="sm" len="sm"/>
+            <a:tailEnd type="triangle"/>
+          </a:ln>
+        </p:spPr>
+        <p:style>
+          <a:lnRef idx="1">
+            <a:schemeClr val="accent1"/>
+          </a:lnRef>
+          <a:fillRef idx="0">
+            <a:schemeClr val="accent1"/>
+          </a:fillRef>
+          <a:effectRef idx="0">
+            <a:schemeClr val="accent1"/>
+          </a:effectRef>
+          <a:fontRef idx="minor">
+            <a:schemeClr val="tx1"/>
+          </a:fontRef>
+        </p:style>
+      </p:cxnSp>
+      <p:cxnSp>
+        <p:nvCxnSpPr>
+          <p:cNvPr id="41" name="Gerade Verbindung mit Pfeil 40">
+            <a:extLst>
+              <a:ext uri="{FF2B5EF4-FFF2-40B4-BE49-F238E27FC236}">
+                <a16:creationId xmlns:a16="http://schemas.microsoft.com/office/drawing/2014/main" id="{C675EF59-6BB0-49E9-BBA0-0C4F7EA1A280}"/>
+              </a:ext>
+            </a:extLst>
+          </p:cNvPr>
+          <p:cNvCxnSpPr>
+            <a:cxnSpLocks/>
+            <a:stCxn id="42" idx="3"/>
+          </p:cNvCxnSpPr>
+          <p:nvPr/>
+        </p:nvCxnSpPr>
+        <p:spPr>
+          <a:xfrm>
+            <a:off x="8044185" y="4861768"/>
+            <a:ext cx="233751" cy="542"/>
+          </a:xfrm>
+          <a:prstGeom prst="straightConnector1">
+            <a:avLst/>
+          </a:prstGeom>
+          <a:ln w="19050">
+            <a:solidFill>
+              <a:schemeClr val="tx1"/>
+            </a:solidFill>
+            <a:tailEnd type="triangle"/>
+          </a:ln>
+        </p:spPr>
+        <p:style>
+          <a:lnRef idx="1">
+            <a:schemeClr val="accent1"/>
+          </a:lnRef>
+          <a:fillRef idx="0">
+            <a:schemeClr val="accent1"/>
+          </a:fillRef>
+          <a:effectRef idx="0">
+            <a:schemeClr val="accent1"/>
+          </a:effectRef>
+          <a:fontRef idx="minor">
+            <a:schemeClr val="tx1"/>
+          </a:fontRef>
+        </p:style>
+      </p:cxnSp>
+      <p:sp>
+        <p:nvSpPr>
+          <p:cNvPr id="42" name="Textfeld 41">
+            <a:extLst>
+              <a:ext uri="{FF2B5EF4-FFF2-40B4-BE49-F238E27FC236}">
+                <a16:creationId xmlns:a16="http://schemas.microsoft.com/office/drawing/2014/main" id="{84444DCF-C62D-4397-9B38-8208F6D67410}"/>
+              </a:ext>
+            </a:extLst>
+          </p:cNvPr>
+          <p:cNvSpPr txBox="1"/>
+          <p:nvPr/>
+        </p:nvSpPr>
+        <p:spPr>
+          <a:xfrm>
+            <a:off x="7790859" y="4756166"/>
+            <a:ext cx="253326" cy="211203"/>
+          </a:xfrm>
+          <a:prstGeom prst="rect">
+            <a:avLst/>
+          </a:prstGeom>
+          <a:solidFill>
+            <a:schemeClr val="bg1"/>
+          </a:solidFill>
+        </p:spPr>
+        <p:txBody>
+          <a:bodyPr wrap="none" lIns="54000" tIns="36000" rIns="54000" bIns="36000" rtlCol="0">
+            <a:spAutoFit/>
+          </a:bodyPr>
+          <a:lstStyle/>
+          <a:p>
+            <a:pPr algn="r"/>
+            <a:r>
+              <a:rPr lang="de-DE" sz="900" dirty="0"/>
+              <a:t>0.5</a:t>
+            </a:r>
+          </a:p>
+        </p:txBody>
+      </p:sp>
+      <p:cxnSp>
+        <p:nvCxnSpPr>
+          <p:cNvPr id="52" name="Gerade Verbindung mit Pfeil 51">
+            <a:extLst>
+              <a:ext uri="{FF2B5EF4-FFF2-40B4-BE49-F238E27FC236}">
+                <a16:creationId xmlns:a16="http://schemas.microsoft.com/office/drawing/2014/main" id="{FB7B5AE8-BAA3-48C9-A334-85027489CE01}"/>
+              </a:ext>
+            </a:extLst>
+          </p:cNvPr>
+          <p:cNvCxnSpPr>
+            <a:cxnSpLocks/>
+            <a:endCxn id="51" idx="1"/>
+          </p:cNvCxnSpPr>
+          <p:nvPr/>
+        </p:nvCxnSpPr>
+        <p:spPr>
+          <a:xfrm>
+            <a:off x="6837937" y="4502310"/>
+            <a:ext cx="1440001" cy="1"/>
+          </a:xfrm>
+          <a:prstGeom prst="straightConnector1">
+            <a:avLst/>
+          </a:prstGeom>
+          <a:ln w="19050">
+            <a:solidFill>
+              <a:schemeClr val="tx1"/>
+            </a:solidFill>
+            <a:tailEnd type="triangle"/>
+          </a:ln>
+        </p:spPr>
+        <p:style>
+          <a:lnRef idx="1">
+            <a:schemeClr val="accent1"/>
+          </a:lnRef>
+          <a:fillRef idx="0">
+            <a:schemeClr val="accent1"/>
+          </a:fillRef>
+          <a:effectRef idx="0">
+            <a:schemeClr val="accent1"/>
+          </a:effectRef>
+          <a:fontRef idx="minor">
+            <a:schemeClr val="tx1"/>
+          </a:fontRef>
+        </p:style>
+      </p:cxnSp>
+      <p:grpSp>
+        <p:nvGrpSpPr>
+          <p:cNvPr id="71" name="Gruppieren 70">
+            <a:extLst>
+              <a:ext uri="{FF2B5EF4-FFF2-40B4-BE49-F238E27FC236}">
+                <a16:creationId xmlns:a16="http://schemas.microsoft.com/office/drawing/2014/main" id="{FFD6BFE5-6418-4B1F-B90C-E3E270479D4B}"/>
+              </a:ext>
+            </a:extLst>
+          </p:cNvPr>
+          <p:cNvGrpSpPr/>
+          <p:nvPr/>
+        </p:nvGrpSpPr>
+        <p:grpSpPr>
+          <a:xfrm>
+            <a:off x="8277937" y="3719680"/>
+            <a:ext cx="1440000" cy="1313326"/>
+            <a:chOff x="6120331" y="2817250"/>
+            <a:chExt cx="1440000" cy="1313326"/>
+          </a:xfrm>
+        </p:grpSpPr>
+        <p:sp>
+          <p:nvSpPr>
+            <p:cNvPr id="46" name="Rechteck 45">
+              <a:extLst>
+                <a:ext uri="{FF2B5EF4-FFF2-40B4-BE49-F238E27FC236}">
+                  <a16:creationId xmlns:a16="http://schemas.microsoft.com/office/drawing/2014/main" id="{0CD61A1B-EC03-4BC6-BE8B-02A4F3849625}"/>
+                </a:ext>
+              </a:extLst>
+            </p:cNvPr>
+            <p:cNvSpPr/>
+            <p:nvPr/>
+          </p:nvSpPr>
+          <p:spPr>
+            <a:xfrm>
+              <a:off x="6120331" y="3059303"/>
+              <a:ext cx="1440000" cy="1071273"/>
+            </a:xfrm>
+            <a:prstGeom prst="rect">
+              <a:avLst/>
+            </a:prstGeom>
+            <a:ln w="19050">
+              <a:solidFill>
+                <a:schemeClr val="tx1"/>
+              </a:solidFill>
+            </a:ln>
+          </p:spPr>
+          <p:style>
+            <a:lnRef idx="2">
+              <a:schemeClr val="dk1"/>
+            </a:lnRef>
+            <a:fillRef idx="1">
+              <a:schemeClr val="lt1"/>
+            </a:fillRef>
+            <a:effectRef idx="0">
+              <a:schemeClr val="dk1"/>
+            </a:effectRef>
+            <a:fontRef idx="minor">
+              <a:schemeClr val="dk1"/>
+            </a:fontRef>
+          </p:style>
+          <p:txBody>
+            <a:bodyPr rtlCol="0" anchor="ctr"/>
+            <a:lstStyle/>
+            <a:p>
+              <a:pPr algn="ctr"/>
+              <a:endParaRPr lang="de-DE" sz="1200" dirty="0"/>
+            </a:p>
+          </p:txBody>
+        </p:sp>
+        <p:sp>
+          <p:nvSpPr>
+            <p:cNvPr id="47" name="Textfeld 46">
+              <a:extLst>
+                <a:ext uri="{FF2B5EF4-FFF2-40B4-BE49-F238E27FC236}">
+                  <a16:creationId xmlns:a16="http://schemas.microsoft.com/office/drawing/2014/main" id="{354285E1-3048-4875-A008-18D8F7566451}"/>
+                </a:ext>
+              </a:extLst>
+            </p:cNvPr>
+            <p:cNvSpPr txBox="1"/>
+            <p:nvPr/>
+          </p:nvSpPr>
+          <p:spPr>
+            <a:xfrm>
+              <a:off x="6120332" y="3115848"/>
+              <a:ext cx="490569" cy="241980"/>
+            </a:xfrm>
+            <a:prstGeom prst="rect">
+              <a:avLst/>
+            </a:prstGeom>
+            <a:noFill/>
+          </p:spPr>
+          <p:txBody>
+            <a:bodyPr wrap="none" lIns="54000" tIns="36000" rIns="54000" bIns="36000" rtlCol="0">
+              <a:spAutoFit/>
+            </a:bodyPr>
+            <a:lstStyle/>
+            <a:p>
+              <a:r>
+                <a:rPr lang="de-DE" sz="1100" dirty="0" err="1"/>
+                <a:t>inputA</a:t>
+              </a:r>
+              <a:endParaRPr lang="de-DE" sz="1100" dirty="0"/>
+            </a:p>
+          </p:txBody>
+        </p:sp>
+        <p:sp>
+          <p:nvSpPr>
+            <p:cNvPr id="48" name="Textfeld 47">
+              <a:extLst>
+                <a:ext uri="{FF2B5EF4-FFF2-40B4-BE49-F238E27FC236}">
+                  <a16:creationId xmlns:a16="http://schemas.microsoft.com/office/drawing/2014/main" id="{359D8A63-3101-4B6E-A53F-FE4568BEEE5C}"/>
+                </a:ext>
+              </a:extLst>
+            </p:cNvPr>
+            <p:cNvSpPr txBox="1"/>
+            <p:nvPr/>
+          </p:nvSpPr>
+          <p:spPr>
+            <a:xfrm>
+              <a:off x="6668784" y="2817250"/>
+              <a:ext cx="343094" cy="257369"/>
+            </a:xfrm>
+            <a:prstGeom prst="rect">
+              <a:avLst/>
+            </a:prstGeom>
+            <a:noFill/>
+          </p:spPr>
+          <p:txBody>
+            <a:bodyPr wrap="none" lIns="54000" tIns="36000" rIns="54000" bIns="36000" rtlCol="0">
+              <a:spAutoFit/>
+            </a:bodyPr>
+            <a:lstStyle/>
+            <a:p>
+              <a:pPr algn="ctr"/>
+              <a:r>
+                <a:rPr lang="de-DE" sz="1200" b="1" dirty="0"/>
+                <a:t>mix</a:t>
+              </a:r>
+            </a:p>
+          </p:txBody>
+        </p:sp>
+        <p:sp>
+          <p:nvSpPr>
+            <p:cNvPr id="51" name="Textfeld 50">
+              <a:extLst>
+                <a:ext uri="{FF2B5EF4-FFF2-40B4-BE49-F238E27FC236}">
+                  <a16:creationId xmlns:a16="http://schemas.microsoft.com/office/drawing/2014/main" id="{CE6BB37B-BC30-4B91-80F0-72505AC8A7A9}"/>
+                </a:ext>
+              </a:extLst>
+            </p:cNvPr>
+            <p:cNvSpPr txBox="1"/>
+            <p:nvPr/>
+          </p:nvSpPr>
+          <p:spPr>
+            <a:xfrm>
+              <a:off x="6120332" y="3478891"/>
+              <a:ext cx="485761" cy="241980"/>
+            </a:xfrm>
+            <a:prstGeom prst="rect">
+              <a:avLst/>
+            </a:prstGeom>
+            <a:noFill/>
+          </p:spPr>
+          <p:txBody>
+            <a:bodyPr wrap="none" lIns="54000" tIns="36000" rIns="54000" bIns="36000" rtlCol="0">
+              <a:spAutoFit/>
+            </a:bodyPr>
+            <a:lstStyle/>
+            <a:p>
+              <a:r>
+                <a:rPr lang="de-DE" sz="1100" dirty="0" err="1"/>
+                <a:t>inputB</a:t>
+              </a:r>
+              <a:endParaRPr lang="de-DE" sz="1100" dirty="0"/>
+            </a:p>
+          </p:txBody>
+        </p:sp>
+        <p:sp>
+          <p:nvSpPr>
+            <p:cNvPr id="53" name="Textfeld 52">
+              <a:extLst>
+                <a:ext uri="{FF2B5EF4-FFF2-40B4-BE49-F238E27FC236}">
+                  <a16:creationId xmlns:a16="http://schemas.microsoft.com/office/drawing/2014/main" id="{1AA13C96-DA95-442D-A1F6-4A4F7485B3AC}"/>
+                </a:ext>
+              </a:extLst>
+            </p:cNvPr>
+            <p:cNvSpPr txBox="1"/>
+            <p:nvPr/>
+          </p:nvSpPr>
+          <p:spPr>
+            <a:xfrm>
+              <a:off x="6120332" y="3842055"/>
+              <a:ext cx="432861" cy="241980"/>
+            </a:xfrm>
+            <a:prstGeom prst="rect">
+              <a:avLst/>
+            </a:prstGeom>
+            <a:noFill/>
+          </p:spPr>
+          <p:txBody>
+            <a:bodyPr wrap="none" lIns="54000" tIns="36000" rIns="54000" bIns="36000" rtlCol="0">
+              <a:spAutoFit/>
+            </a:bodyPr>
+            <a:lstStyle/>
+            <a:p>
+              <a:r>
+                <a:rPr lang="de-DE" sz="1100" dirty="0" err="1"/>
+                <a:t>blend</a:t>
+              </a:r>
+              <a:endParaRPr lang="de-DE" sz="1100" dirty="0"/>
+            </a:p>
+          </p:txBody>
+        </p:sp>
+      </p:grpSp>
+      <p:cxnSp>
+        <p:nvCxnSpPr>
+          <p:cNvPr id="60" name="Verbinder: gewinkelt 59">
+            <a:extLst>
+              <a:ext uri="{FF2B5EF4-FFF2-40B4-BE49-F238E27FC236}">
+                <a16:creationId xmlns:a16="http://schemas.microsoft.com/office/drawing/2014/main" id="{504F5569-CAE0-4D51-85DD-681CCD983651}"/>
+              </a:ext>
+            </a:extLst>
+          </p:cNvPr>
+          <p:cNvCxnSpPr>
+            <a:cxnSpLocks/>
+            <a:stCxn id="4" idx="3"/>
+            <a:endCxn id="47" idx="1"/>
+          </p:cNvCxnSpPr>
+          <p:nvPr/>
+        </p:nvCxnSpPr>
+        <p:spPr>
+          <a:xfrm>
+            <a:off x="6837937" y="3062310"/>
+            <a:ext cx="1440001" cy="1076958"/>
+          </a:xfrm>
+          <a:prstGeom prst="bentConnector3">
+            <a:avLst>
+              <a:gd name="adj1" fmla="val 50000"/>
+            </a:avLst>
+          </a:prstGeom>
+          <a:ln w="19050">
+            <a:solidFill>
+              <a:schemeClr val="tx1"/>
+            </a:solidFill>
+            <a:headEnd type="none"/>
+            <a:tailEnd type="triangle"/>
+          </a:ln>
+        </p:spPr>
+        <p:style>
+          <a:lnRef idx="1">
+            <a:schemeClr val="accent1"/>
+          </a:lnRef>
+          <a:fillRef idx="0">
+            <a:schemeClr val="accent1"/>
+          </a:fillRef>
+          <a:effectRef idx="0">
+            <a:schemeClr val="accent1"/>
+          </a:effectRef>
+          <a:fontRef idx="minor">
+            <a:schemeClr val="tx1"/>
+          </a:fontRef>
+        </p:style>
+      </p:cxnSp>
+      <p:cxnSp>
+        <p:nvCxnSpPr>
+          <p:cNvPr id="64" name="Gerade Verbindung mit Pfeil 63">
+            <a:extLst>
+              <a:ext uri="{FF2B5EF4-FFF2-40B4-BE49-F238E27FC236}">
+                <a16:creationId xmlns:a16="http://schemas.microsoft.com/office/drawing/2014/main" id="{41CCF889-5796-4721-9FB6-7898EDD3C46A}"/>
+              </a:ext>
+            </a:extLst>
+          </p:cNvPr>
+          <p:cNvCxnSpPr>
+            <a:cxnSpLocks/>
+          </p:cNvCxnSpPr>
+          <p:nvPr/>
+        </p:nvCxnSpPr>
+        <p:spPr>
+          <a:xfrm>
+            <a:off x="9716135" y="4502310"/>
+            <a:ext cx="1080001" cy="4942"/>
+          </a:xfrm>
+          <a:prstGeom prst="straightConnector1">
+            <a:avLst/>
+          </a:prstGeom>
+          <a:ln w="19050">
+            <a:solidFill>
+              <a:schemeClr val="tx1"/>
+            </a:solidFill>
+            <a:tailEnd type="triangle"/>
+          </a:ln>
+        </p:spPr>
+        <p:style>
+          <a:lnRef idx="1">
+            <a:schemeClr val="accent1"/>
+          </a:lnRef>
+          <a:fillRef idx="0">
+            <a:schemeClr val="accent1"/>
+          </a:fillRef>
+          <a:effectRef idx="0">
+            <a:schemeClr val="accent1"/>
+          </a:effectRef>
+          <a:fontRef idx="minor">
+            <a:schemeClr val="tx1"/>
+          </a:fontRef>
+        </p:style>
+      </p:cxnSp>
+      <p:grpSp>
+        <p:nvGrpSpPr>
+          <p:cNvPr id="68" name="Gruppieren 67">
+            <a:extLst>
+              <a:ext uri="{FF2B5EF4-FFF2-40B4-BE49-F238E27FC236}">
+                <a16:creationId xmlns:a16="http://schemas.microsoft.com/office/drawing/2014/main" id="{AF14C970-0F83-4EDC-B0BF-2022A7CB1A28}"/>
+              </a:ext>
+            </a:extLst>
+          </p:cNvPr>
+          <p:cNvGrpSpPr/>
+          <p:nvPr/>
+        </p:nvGrpSpPr>
+        <p:grpSpPr>
+          <a:xfrm>
+            <a:off x="5397936" y="2460257"/>
+            <a:ext cx="1440001" cy="962053"/>
+            <a:chOff x="3240330" y="1557827"/>
+            <a:chExt cx="1440001" cy="962053"/>
+          </a:xfrm>
+        </p:grpSpPr>
+        <p:sp>
+          <p:nvSpPr>
+            <p:cNvPr id="4" name="Rechteck 3">
+              <a:extLst>
+                <a:ext uri="{FF2B5EF4-FFF2-40B4-BE49-F238E27FC236}">
+                  <a16:creationId xmlns:a16="http://schemas.microsoft.com/office/drawing/2014/main" id="{EABC0166-CCFE-45F5-A572-BA71CA4AC7AA}"/>
+                </a:ext>
+              </a:extLst>
+            </p:cNvPr>
+            <p:cNvSpPr/>
+            <p:nvPr/>
+          </p:nvSpPr>
+          <p:spPr>
+            <a:xfrm>
+              <a:off x="3240331" y="1799880"/>
+              <a:ext cx="1440000" cy="720000"/>
+            </a:xfrm>
+            <a:prstGeom prst="rect">
+              <a:avLst/>
+            </a:prstGeom>
+            <a:ln w="19050">
+              <a:solidFill>
+                <a:schemeClr val="tx1"/>
+              </a:solidFill>
+            </a:ln>
+          </p:spPr>
+          <p:style>
+            <a:lnRef idx="2">
+              <a:schemeClr val="dk1"/>
+            </a:lnRef>
+            <a:fillRef idx="1">
+              <a:schemeClr val="lt1"/>
+            </a:fillRef>
+            <a:effectRef idx="0">
+              <a:schemeClr val="dk1"/>
+            </a:effectRef>
+            <a:fontRef idx="minor">
+              <a:schemeClr val="dk1"/>
+            </a:fontRef>
+          </p:style>
+          <p:txBody>
+            <a:bodyPr rtlCol="0" anchor="ctr"/>
+            <a:lstStyle/>
+            <a:p>
+              <a:pPr algn="ctr"/>
+              <a:endParaRPr lang="de-DE" sz="1200" dirty="0"/>
+            </a:p>
+          </p:txBody>
+        </p:sp>
+        <p:sp>
+          <p:nvSpPr>
+            <p:cNvPr id="8" name="Textfeld 7">
+              <a:extLst>
+                <a:ext uri="{FF2B5EF4-FFF2-40B4-BE49-F238E27FC236}">
+                  <a16:creationId xmlns:a16="http://schemas.microsoft.com/office/drawing/2014/main" id="{7792323A-2C39-477F-B727-B3A32B620F4F}"/>
+                </a:ext>
+              </a:extLst>
+            </p:cNvPr>
+            <p:cNvSpPr txBox="1"/>
+            <p:nvPr/>
+          </p:nvSpPr>
+          <p:spPr>
+            <a:xfrm>
+              <a:off x="3240332" y="1861285"/>
+              <a:ext cx="408817" cy="241980"/>
+            </a:xfrm>
+            <a:prstGeom prst="rect">
+              <a:avLst/>
+            </a:prstGeom>
+            <a:noFill/>
+          </p:spPr>
+          <p:txBody>
+            <a:bodyPr wrap="none" lIns="54000" tIns="36000" rIns="54000" bIns="36000" rtlCol="0">
+              <a:spAutoFit/>
+            </a:bodyPr>
+            <a:lstStyle/>
+            <a:p>
+              <a:r>
+                <a:rPr lang="de-DE" sz="1100" dirty="0" err="1"/>
+                <a:t>input</a:t>
+              </a:r>
+              <a:endParaRPr lang="de-DE" sz="1100" dirty="0"/>
+            </a:p>
+          </p:txBody>
+        </p:sp>
+        <p:sp>
+          <p:nvSpPr>
+            <p:cNvPr id="9" name="Textfeld 8">
+              <a:extLst>
+                <a:ext uri="{FF2B5EF4-FFF2-40B4-BE49-F238E27FC236}">
+                  <a16:creationId xmlns:a16="http://schemas.microsoft.com/office/drawing/2014/main" id="{D556A1E1-4E12-4CCC-8DFE-1DBD02677F9B}"/>
+                </a:ext>
+              </a:extLst>
+            </p:cNvPr>
+            <p:cNvSpPr txBox="1"/>
+            <p:nvPr/>
+          </p:nvSpPr>
+          <p:spPr>
+            <a:xfrm>
+              <a:off x="3759130" y="1557827"/>
+              <a:ext cx="402405" cy="257369"/>
+            </a:xfrm>
+            <a:prstGeom prst="rect">
+              <a:avLst/>
+            </a:prstGeom>
+            <a:noFill/>
+          </p:spPr>
+          <p:txBody>
+            <a:bodyPr wrap="none" lIns="54000" tIns="36000" rIns="54000" bIns="36000" rtlCol="0">
+              <a:spAutoFit/>
+            </a:bodyPr>
+            <a:lstStyle/>
+            <a:p>
+              <a:pPr algn="ctr"/>
+              <a:r>
+                <a:rPr lang="de-DE" sz="1200" b="1" dirty="0" err="1"/>
+                <a:t>limit</a:t>
+              </a:r>
+              <a:endParaRPr lang="de-DE" sz="1200" b="1" dirty="0"/>
+            </a:p>
+          </p:txBody>
+        </p:sp>
+        <p:sp>
+          <p:nvSpPr>
+            <p:cNvPr id="66" name="Textfeld 65">
+              <a:extLst>
+                <a:ext uri="{FF2B5EF4-FFF2-40B4-BE49-F238E27FC236}">
+                  <a16:creationId xmlns:a16="http://schemas.microsoft.com/office/drawing/2014/main" id="{42C599B8-2F9B-4FDF-95A7-681082023B5D}"/>
+                </a:ext>
+              </a:extLst>
+            </p:cNvPr>
+            <p:cNvSpPr txBox="1"/>
+            <p:nvPr/>
+          </p:nvSpPr>
+          <p:spPr>
+            <a:xfrm>
+              <a:off x="3240330" y="2210700"/>
+              <a:ext cx="657282" cy="241980"/>
+            </a:xfrm>
+            <a:prstGeom prst="rect">
+              <a:avLst/>
+            </a:prstGeom>
+            <a:noFill/>
+          </p:spPr>
+          <p:txBody>
+            <a:bodyPr wrap="none" lIns="54000" tIns="36000" rIns="54000" bIns="36000" rtlCol="0">
+              <a:spAutoFit/>
+            </a:bodyPr>
+            <a:lstStyle/>
+            <a:p>
+              <a:r>
+                <a:rPr lang="de-DE" sz="1100" dirty="0" err="1"/>
+                <a:t>threshold</a:t>
+              </a:r>
+              <a:endParaRPr lang="de-DE" sz="1100" dirty="0"/>
+            </a:p>
+          </p:txBody>
+        </p:sp>
+      </p:grpSp>
+      <p:sp>
+        <p:nvSpPr>
+          <p:cNvPr id="72" name="Textfeld 71">
+            <a:extLst>
+              <a:ext uri="{FF2B5EF4-FFF2-40B4-BE49-F238E27FC236}">
+                <a16:creationId xmlns:a16="http://schemas.microsoft.com/office/drawing/2014/main" id="{75B1F42C-B0E9-4230-B4B9-9945CF16A1B2}"/>
+              </a:ext>
+            </a:extLst>
+          </p:cNvPr>
+          <p:cNvSpPr txBox="1"/>
+          <p:nvPr/>
+        </p:nvSpPr>
+        <p:spPr>
+          <a:xfrm>
+            <a:off x="5479115" y="781282"/>
+            <a:ext cx="1277644" cy="257369"/>
+          </a:xfrm>
+          <a:prstGeom prst="rect">
+            <a:avLst/>
+          </a:prstGeom>
+          <a:noFill/>
+        </p:spPr>
+        <p:txBody>
+          <a:bodyPr wrap="none" lIns="54000" tIns="36000" rIns="54000" bIns="36000" rtlCol="0">
+            <a:spAutoFit/>
+          </a:bodyPr>
+          <a:lstStyle/>
+          <a:p>
+            <a:pPr algn="ctr"/>
+            <a:r>
+              <a:rPr lang="de-DE" sz="1200" b="1" dirty="0" err="1"/>
+              <a:t>blendedDistortion</a:t>
+            </a:r>
+            <a:endParaRPr lang="de-DE" sz="1200" b="1" dirty="0"/>
+          </a:p>
+        </p:txBody>
+      </p:sp>
+      <p:sp>
+        <p:nvSpPr>
+          <p:cNvPr id="45" name="Textfeld 44">
+            <a:extLst>
+              <a:ext uri="{FF2B5EF4-FFF2-40B4-BE49-F238E27FC236}">
+                <a16:creationId xmlns:a16="http://schemas.microsoft.com/office/drawing/2014/main" id="{34E93AE4-EF6D-49B5-9FB7-1FC2F15FC376}"/>
+              </a:ext>
+            </a:extLst>
+          </p:cNvPr>
+          <p:cNvSpPr txBox="1"/>
+          <p:nvPr/>
+        </p:nvSpPr>
+        <p:spPr>
+          <a:xfrm>
+            <a:off x="10796136" y="4386263"/>
+            <a:ext cx="389581" cy="241980"/>
+          </a:xfrm>
+          <a:prstGeom prst="rect">
+            <a:avLst/>
+          </a:prstGeom>
+          <a:solidFill>
+            <a:schemeClr val="bg1"/>
+          </a:solidFill>
+        </p:spPr>
+        <p:txBody>
+          <a:bodyPr wrap="none" lIns="54000" tIns="36000" rIns="54000" bIns="36000" rtlCol="0">
+            <a:spAutoFit/>
+          </a:bodyPr>
+          <a:lstStyle/>
+          <a:p>
+            <a:r>
+              <a:rPr lang="de-DE" sz="1100" dirty="0"/>
+              <a:t>(out)</a:t>
+            </a:r>
+          </a:p>
+        </p:txBody>
+      </p:sp>
+      <p:grpSp>
+        <p:nvGrpSpPr>
+          <p:cNvPr id="43" name="Gruppieren 42">
+            <a:extLst>
+              <a:ext uri="{FF2B5EF4-FFF2-40B4-BE49-F238E27FC236}">
+                <a16:creationId xmlns:a16="http://schemas.microsoft.com/office/drawing/2014/main" id="{BEFB9624-C430-4EC7-BDA6-69494AC4AACC}"/>
+              </a:ext>
+            </a:extLst>
+          </p:cNvPr>
+          <p:cNvGrpSpPr/>
+          <p:nvPr/>
+        </p:nvGrpSpPr>
+        <p:grpSpPr>
+          <a:xfrm>
+            <a:off x="2507915" y="2277828"/>
+            <a:ext cx="1452416" cy="962053"/>
+            <a:chOff x="3227915" y="1557827"/>
+            <a:chExt cx="1452416" cy="962053"/>
+          </a:xfrm>
+        </p:grpSpPr>
+        <p:sp>
+          <p:nvSpPr>
+            <p:cNvPr id="44" name="Rechteck 43">
+              <a:extLst>
+                <a:ext uri="{FF2B5EF4-FFF2-40B4-BE49-F238E27FC236}">
+                  <a16:creationId xmlns:a16="http://schemas.microsoft.com/office/drawing/2014/main" id="{1F414FD4-B850-48F5-8DE7-F52A947D9CAF}"/>
+                </a:ext>
+              </a:extLst>
+            </p:cNvPr>
+            <p:cNvSpPr/>
+            <p:nvPr/>
+          </p:nvSpPr>
+          <p:spPr>
+            <a:xfrm>
+              <a:off x="3240331" y="1799880"/>
+              <a:ext cx="1440000" cy="720000"/>
+            </a:xfrm>
+            <a:prstGeom prst="rect">
+              <a:avLst/>
+            </a:prstGeom>
+            <a:ln w="19050">
+              <a:solidFill>
+                <a:schemeClr val="tx1"/>
+              </a:solidFill>
+            </a:ln>
+          </p:spPr>
+          <p:style>
+            <a:lnRef idx="2">
+              <a:schemeClr val="dk1"/>
+            </a:lnRef>
+            <a:fillRef idx="1">
+              <a:schemeClr val="lt1"/>
+            </a:fillRef>
+            <a:effectRef idx="0">
+              <a:schemeClr val="dk1"/>
+            </a:effectRef>
+            <a:fontRef idx="minor">
+              <a:schemeClr val="dk1"/>
+            </a:fontRef>
+          </p:style>
+          <p:txBody>
+            <a:bodyPr rtlCol="0" anchor="ctr"/>
+            <a:lstStyle/>
+            <a:p>
+              <a:pPr algn="ctr"/>
+              <a:endParaRPr lang="de-DE" sz="1200" dirty="0"/>
+            </a:p>
+          </p:txBody>
+        </p:sp>
+        <p:sp>
+          <p:nvSpPr>
+            <p:cNvPr id="49" name="Textfeld 48">
+              <a:extLst>
+                <a:ext uri="{FF2B5EF4-FFF2-40B4-BE49-F238E27FC236}">
+                  <a16:creationId xmlns:a16="http://schemas.microsoft.com/office/drawing/2014/main" id="{3D993ACB-741B-487C-9156-480AFFD6DC21}"/>
+                </a:ext>
+              </a:extLst>
+            </p:cNvPr>
+            <p:cNvSpPr txBox="1"/>
+            <p:nvPr/>
+          </p:nvSpPr>
+          <p:spPr>
+            <a:xfrm>
+              <a:off x="3235047" y="1856425"/>
+              <a:ext cx="408817" cy="241980"/>
+            </a:xfrm>
+            <a:prstGeom prst="rect">
+              <a:avLst/>
+            </a:prstGeom>
+            <a:noFill/>
+          </p:spPr>
+          <p:txBody>
+            <a:bodyPr wrap="none" lIns="54000" tIns="36000" rIns="54000" bIns="36000" rtlCol="0">
+              <a:spAutoFit/>
+            </a:bodyPr>
+            <a:lstStyle/>
+            <a:p>
+              <a:r>
+                <a:rPr lang="de-DE" sz="1100" dirty="0" err="1"/>
+                <a:t>input</a:t>
+              </a:r>
+              <a:endParaRPr lang="de-DE" sz="1100" dirty="0"/>
+            </a:p>
+          </p:txBody>
+        </p:sp>
+        <p:sp>
+          <p:nvSpPr>
+            <p:cNvPr id="50" name="Textfeld 49">
+              <a:extLst>
+                <a:ext uri="{FF2B5EF4-FFF2-40B4-BE49-F238E27FC236}">
+                  <a16:creationId xmlns:a16="http://schemas.microsoft.com/office/drawing/2014/main" id="{73094A8A-6D5E-4A9B-80D7-1984125B0E4E}"/>
+                </a:ext>
+              </a:extLst>
+            </p:cNvPr>
+            <p:cNvSpPr txBox="1"/>
+            <p:nvPr/>
+          </p:nvSpPr>
+          <p:spPr>
+            <a:xfrm>
+              <a:off x="3763938" y="1557827"/>
+              <a:ext cx="392787" cy="257369"/>
+            </a:xfrm>
+            <a:prstGeom prst="rect">
+              <a:avLst/>
+            </a:prstGeom>
+            <a:noFill/>
+          </p:spPr>
+          <p:txBody>
+            <a:bodyPr wrap="none" lIns="54000" tIns="36000" rIns="54000" bIns="36000" rtlCol="0">
+              <a:spAutoFit/>
+            </a:bodyPr>
+            <a:lstStyle/>
+            <a:p>
+              <a:pPr algn="ctr"/>
+              <a:r>
+                <a:rPr lang="de-DE" sz="1200" b="1" dirty="0" err="1"/>
+                <a:t>amp</a:t>
+              </a:r>
+              <a:endParaRPr lang="de-DE" sz="1200" b="1" dirty="0"/>
+            </a:p>
+          </p:txBody>
+        </p:sp>
+        <p:sp>
+          <p:nvSpPr>
+            <p:cNvPr id="54" name="Textfeld 53">
+              <a:extLst>
+                <a:ext uri="{FF2B5EF4-FFF2-40B4-BE49-F238E27FC236}">
+                  <a16:creationId xmlns:a16="http://schemas.microsoft.com/office/drawing/2014/main" id="{18A610DF-0A02-4F51-A8C5-42C5BF89309A}"/>
+                </a:ext>
+              </a:extLst>
+            </p:cNvPr>
+            <p:cNvSpPr txBox="1"/>
+            <p:nvPr/>
+          </p:nvSpPr>
+          <p:spPr>
+            <a:xfrm>
+              <a:off x="3227915" y="2214574"/>
+              <a:ext cx="556293" cy="241980"/>
+            </a:xfrm>
+            <a:prstGeom prst="rect">
+              <a:avLst/>
+            </a:prstGeom>
+            <a:noFill/>
+          </p:spPr>
+          <p:txBody>
+            <a:bodyPr wrap="none" lIns="54000" tIns="36000" rIns="54000" bIns="36000" rtlCol="0">
+              <a:spAutoFit/>
+            </a:bodyPr>
+            <a:lstStyle/>
+            <a:p>
+              <a:r>
+                <a:rPr lang="de-DE" sz="1100" dirty="0" err="1"/>
+                <a:t>amount</a:t>
+              </a:r>
+              <a:endParaRPr lang="de-DE" sz="1100" dirty="0"/>
+            </a:p>
+          </p:txBody>
+        </p:sp>
+      </p:grpSp>
+      <p:grpSp>
+        <p:nvGrpSpPr>
+          <p:cNvPr id="58" name="Gruppieren 57">
+            <a:extLst>
+              <a:ext uri="{FF2B5EF4-FFF2-40B4-BE49-F238E27FC236}">
+                <a16:creationId xmlns:a16="http://schemas.microsoft.com/office/drawing/2014/main" id="{834E7F82-E7AC-458D-8A6C-64F5398DCD66}"/>
+              </a:ext>
+            </a:extLst>
+          </p:cNvPr>
+          <p:cNvGrpSpPr/>
+          <p:nvPr/>
+        </p:nvGrpSpPr>
+        <p:grpSpPr>
+          <a:xfrm>
+            <a:off x="5399739" y="3891875"/>
+            <a:ext cx="1440001" cy="962053"/>
+            <a:chOff x="3240330" y="1557827"/>
+            <a:chExt cx="1440001" cy="962053"/>
+          </a:xfrm>
+        </p:grpSpPr>
+        <p:sp>
+          <p:nvSpPr>
+            <p:cNvPr id="59" name="Rechteck 58">
+              <a:extLst>
+                <a:ext uri="{FF2B5EF4-FFF2-40B4-BE49-F238E27FC236}">
+                  <a16:creationId xmlns:a16="http://schemas.microsoft.com/office/drawing/2014/main" id="{B1077919-43F5-4EFA-97EA-783F2900CF93}"/>
+                </a:ext>
+              </a:extLst>
+            </p:cNvPr>
+            <p:cNvSpPr/>
+            <p:nvPr/>
+          </p:nvSpPr>
+          <p:spPr>
+            <a:xfrm>
+              <a:off x="3240331" y="1799880"/>
+              <a:ext cx="1440000" cy="720000"/>
+            </a:xfrm>
+            <a:prstGeom prst="rect">
+              <a:avLst/>
+            </a:prstGeom>
+            <a:ln w="19050">
+              <a:solidFill>
+                <a:schemeClr val="tx1"/>
+              </a:solidFill>
+            </a:ln>
+          </p:spPr>
+          <p:style>
+            <a:lnRef idx="2">
+              <a:schemeClr val="dk1"/>
+            </a:lnRef>
+            <a:fillRef idx="1">
+              <a:schemeClr val="lt1"/>
+            </a:fillRef>
+            <a:effectRef idx="0">
+              <a:schemeClr val="dk1"/>
+            </a:effectRef>
+            <a:fontRef idx="minor">
+              <a:schemeClr val="dk1"/>
+            </a:fontRef>
+          </p:style>
+          <p:txBody>
+            <a:bodyPr rtlCol="0" anchor="ctr"/>
+            <a:lstStyle/>
+            <a:p>
+              <a:pPr algn="ctr"/>
+              <a:endParaRPr lang="de-DE" sz="1200" dirty="0"/>
+            </a:p>
+          </p:txBody>
+        </p:sp>
+        <p:sp>
+          <p:nvSpPr>
+            <p:cNvPr id="61" name="Textfeld 60">
+              <a:extLst>
+                <a:ext uri="{FF2B5EF4-FFF2-40B4-BE49-F238E27FC236}">
+                  <a16:creationId xmlns:a16="http://schemas.microsoft.com/office/drawing/2014/main" id="{7FD80846-2981-4AB8-B462-F81AADACE0ED}"/>
+                </a:ext>
+              </a:extLst>
+            </p:cNvPr>
+            <p:cNvSpPr txBox="1"/>
+            <p:nvPr/>
+          </p:nvSpPr>
+          <p:spPr>
+            <a:xfrm>
+              <a:off x="3240332" y="1856425"/>
+              <a:ext cx="408817" cy="241980"/>
+            </a:xfrm>
+            <a:prstGeom prst="rect">
+              <a:avLst/>
+            </a:prstGeom>
+            <a:noFill/>
+          </p:spPr>
+          <p:txBody>
+            <a:bodyPr wrap="none" lIns="54000" tIns="36000" rIns="54000" bIns="36000" rtlCol="0">
+              <a:spAutoFit/>
+            </a:bodyPr>
+            <a:lstStyle/>
+            <a:p>
+              <a:r>
+                <a:rPr lang="de-DE" sz="1100" dirty="0" err="1"/>
+                <a:t>input</a:t>
+              </a:r>
+              <a:endParaRPr lang="de-DE" sz="1100" dirty="0"/>
+            </a:p>
+          </p:txBody>
+        </p:sp>
+        <p:sp>
+          <p:nvSpPr>
+            <p:cNvPr id="62" name="Textfeld 61">
+              <a:extLst>
+                <a:ext uri="{FF2B5EF4-FFF2-40B4-BE49-F238E27FC236}">
+                  <a16:creationId xmlns:a16="http://schemas.microsoft.com/office/drawing/2014/main" id="{879BCEE5-DAEF-49E9-A045-DF5C9E1C358C}"/>
+                </a:ext>
+              </a:extLst>
+            </p:cNvPr>
+            <p:cNvSpPr txBox="1"/>
+            <p:nvPr/>
+          </p:nvSpPr>
+          <p:spPr>
+            <a:xfrm>
+              <a:off x="3649390" y="1557827"/>
+              <a:ext cx="621887" cy="257369"/>
+            </a:xfrm>
+            <a:prstGeom prst="rect">
+              <a:avLst/>
+            </a:prstGeom>
+            <a:noFill/>
+          </p:spPr>
+          <p:txBody>
+            <a:bodyPr wrap="none" lIns="54000" tIns="36000" rIns="54000" bIns="36000" rtlCol="0">
+              <a:spAutoFit/>
+            </a:bodyPr>
+            <a:lstStyle/>
+            <a:p>
+              <a:pPr algn="ctr"/>
+              <a:r>
+                <a:rPr lang="de-DE" sz="1200" b="1" dirty="0" err="1"/>
+                <a:t>lowPass</a:t>
+              </a:r>
+              <a:endParaRPr lang="de-DE" sz="1200" b="1" dirty="0"/>
+            </a:p>
+          </p:txBody>
+        </p:sp>
+        <p:sp>
+          <p:nvSpPr>
+            <p:cNvPr id="63" name="Textfeld 62">
+              <a:extLst>
+                <a:ext uri="{FF2B5EF4-FFF2-40B4-BE49-F238E27FC236}">
+                  <a16:creationId xmlns:a16="http://schemas.microsoft.com/office/drawing/2014/main" id="{BC7886CD-8F6B-4648-9EE5-D5A3502E53DF}"/>
+                </a:ext>
+              </a:extLst>
+            </p:cNvPr>
+            <p:cNvSpPr txBox="1"/>
+            <p:nvPr/>
+          </p:nvSpPr>
+          <p:spPr>
+            <a:xfrm>
+              <a:off x="3240330" y="2210700"/>
+              <a:ext cx="275767" cy="241980"/>
+            </a:xfrm>
+            <a:prstGeom prst="rect">
+              <a:avLst/>
+            </a:prstGeom>
+            <a:noFill/>
+          </p:spPr>
+          <p:txBody>
+            <a:bodyPr wrap="none" lIns="54000" tIns="36000" rIns="54000" bIns="36000" rtlCol="0">
+              <a:spAutoFit/>
+            </a:bodyPr>
+            <a:lstStyle/>
+            <a:p>
+              <a:r>
+                <a:rPr lang="de-DE" sz="1100" dirty="0" err="1"/>
+                <a:t>frq</a:t>
+              </a:r>
+              <a:endParaRPr lang="de-DE" sz="1100" dirty="0"/>
+            </a:p>
+          </p:txBody>
+        </p:sp>
+      </p:grpSp>
+      <p:sp>
+        <p:nvSpPr>
+          <p:cNvPr id="84" name="Ellipse 83">
+            <a:extLst>
+              <a:ext uri="{FF2B5EF4-FFF2-40B4-BE49-F238E27FC236}">
+                <a16:creationId xmlns:a16="http://schemas.microsoft.com/office/drawing/2014/main" id="{87016E8B-1556-48EA-A334-904ED56A19DF}"/>
+              </a:ext>
+            </a:extLst>
+          </p:cNvPr>
+          <p:cNvSpPr/>
+          <p:nvPr/>
+        </p:nvSpPr>
+        <p:spPr>
+          <a:xfrm>
+            <a:off x="4295359" y="2659739"/>
+            <a:ext cx="419045" cy="419045"/>
+          </a:xfrm>
+          <a:prstGeom prst="ellipse">
+            <a:avLst/>
+          </a:prstGeom>
+          <a:solidFill>
+            <a:srgbClr val="FF0000">
+              <a:alpha val="25000"/>
+            </a:srgbClr>
+          </a:solidFill>
+          <a:ln>
+            <a:solidFill>
+              <a:schemeClr val="bg1">
+                <a:lumMod val="50000"/>
+              </a:schemeClr>
+            </a:solidFill>
+          </a:ln>
+        </p:spPr>
+        <p:style>
+          <a:lnRef idx="2">
+            <a:schemeClr val="accent1">
+              <a:shade val="50000"/>
+            </a:schemeClr>
+          </a:lnRef>
+          <a:fillRef idx="1">
+            <a:schemeClr val="accent1"/>
+          </a:fillRef>
+          <a:effectRef idx="0">
+            <a:schemeClr val="accent1"/>
+          </a:effectRef>
+          <a:fontRef idx="minor">
+            <a:schemeClr val="lt1"/>
+          </a:fontRef>
+        </p:style>
+        <p:txBody>
+          <a:bodyPr rtlCol="0" anchor="ctr"/>
+          <a:lstStyle/>
+          <a:p>
+            <a:pPr algn="ctr"/>
+            <a:endParaRPr lang="de-DE"/>
+          </a:p>
+        </p:txBody>
+      </p:sp>
+      <p:cxnSp>
+        <p:nvCxnSpPr>
+          <p:cNvPr id="96" name="Gerader Verbinder 95">
+            <a:extLst>
+              <a:ext uri="{FF2B5EF4-FFF2-40B4-BE49-F238E27FC236}">
+                <a16:creationId xmlns:a16="http://schemas.microsoft.com/office/drawing/2014/main" id="{84F059B9-4325-480B-860A-B132AD2D72F1}"/>
+              </a:ext>
+            </a:extLst>
+          </p:cNvPr>
+          <p:cNvCxnSpPr>
+            <a:cxnSpLocks/>
+            <a:stCxn id="84" idx="0"/>
+            <a:endCxn id="104" idx="2"/>
+          </p:cNvCxnSpPr>
+          <p:nvPr/>
+        </p:nvCxnSpPr>
+        <p:spPr>
+          <a:xfrm flipH="1" flipV="1">
+            <a:off x="4504881" y="1738566"/>
+            <a:ext cx="1" cy="921173"/>
+          </a:xfrm>
+          <a:prstGeom prst="line">
+            <a:avLst/>
+          </a:prstGeom>
+          <a:ln w="12700">
+            <a:solidFill>
+              <a:schemeClr val="bg1">
+                <a:lumMod val="50000"/>
+              </a:schemeClr>
+            </a:solidFill>
+            <a:prstDash val="dash"/>
+          </a:ln>
+        </p:spPr>
+        <p:style>
+          <a:lnRef idx="1">
+            <a:schemeClr val="accent1"/>
+          </a:lnRef>
+          <a:fillRef idx="0">
+            <a:schemeClr val="accent1"/>
+          </a:fillRef>
+          <a:effectRef idx="0">
+            <a:schemeClr val="accent1"/>
+          </a:effectRef>
+          <a:fontRef idx="minor">
+            <a:schemeClr val="tx1"/>
+          </a:fontRef>
+        </p:style>
+      </p:cxnSp>
+      <p:sp>
+        <p:nvSpPr>
+          <p:cNvPr id="104" name="Textfeld 103">
+            <a:extLst>
+              <a:ext uri="{FF2B5EF4-FFF2-40B4-BE49-F238E27FC236}">
+                <a16:creationId xmlns:a16="http://schemas.microsoft.com/office/drawing/2014/main" id="{19F67301-B79C-47B0-97BF-27DF34DD58E7}"/>
+              </a:ext>
+            </a:extLst>
+          </p:cNvPr>
+          <p:cNvSpPr txBox="1"/>
+          <p:nvPr/>
+        </p:nvSpPr>
+        <p:spPr>
+          <a:xfrm>
+            <a:off x="4160594" y="1481197"/>
+            <a:ext cx="688573" cy="257369"/>
+          </a:xfrm>
+          <a:prstGeom prst="rect">
+            <a:avLst/>
+          </a:prstGeom>
+          <a:solidFill>
+            <a:srgbClr val="FF0000">
+              <a:alpha val="25000"/>
+            </a:srgbClr>
+          </a:solidFill>
+        </p:spPr>
+        <p:txBody>
+          <a:bodyPr wrap="none" lIns="54000" tIns="36000" rIns="54000" bIns="36000" rtlCol="0">
+            <a:spAutoFit/>
+          </a:bodyPr>
+          <a:lstStyle/>
+          <a:p>
+            <a:pPr algn="ctr"/>
+            <a:r>
+              <a:rPr lang="de-DE" sz="1200" i="1" dirty="0"/>
+              <a:t>„</a:t>
+            </a:r>
+            <a:r>
+              <a:rPr lang="de-DE" sz="1200" i="1" dirty="0" err="1"/>
+              <a:t>amped</a:t>
+            </a:r>
+            <a:r>
+              <a:rPr lang="de-DE" sz="1200" i="1" dirty="0"/>
+              <a:t>“</a:t>
+            </a:r>
+          </a:p>
+        </p:txBody>
+      </p:sp>
+      <p:cxnSp>
+        <p:nvCxnSpPr>
+          <p:cNvPr id="85" name="Gerade Verbindung mit Pfeil 84">
+            <a:extLst>
+              <a:ext uri="{FF2B5EF4-FFF2-40B4-BE49-F238E27FC236}">
+                <a16:creationId xmlns:a16="http://schemas.microsoft.com/office/drawing/2014/main" id="{157E1C74-E4F7-41BA-8A8F-2FAC42184E09}"/>
+              </a:ext>
+            </a:extLst>
+          </p:cNvPr>
+          <p:cNvCxnSpPr>
+            <a:cxnSpLocks/>
+            <a:endCxn id="54" idx="1"/>
+          </p:cNvCxnSpPr>
+          <p:nvPr/>
+        </p:nvCxnSpPr>
+        <p:spPr>
+          <a:xfrm flipV="1">
+            <a:off x="1440043" y="3055565"/>
+            <a:ext cx="1067872" cy="6745"/>
+          </a:xfrm>
+          <a:prstGeom prst="straightConnector1">
+            <a:avLst/>
+          </a:prstGeom>
+          <a:ln w="19050" cap="flat">
+            <a:solidFill>
+              <a:schemeClr val="tx1"/>
+            </a:solidFill>
+            <a:headEnd type="oval" w="med" len="med"/>
+            <a:tailEnd type="triangle"/>
+          </a:ln>
+        </p:spPr>
+        <p:style>
+          <a:lnRef idx="1">
+            <a:schemeClr val="accent1"/>
+          </a:lnRef>
+          <a:fillRef idx="0">
+            <a:schemeClr val="accent1"/>
+          </a:fillRef>
+          <a:effectRef idx="0">
+            <a:schemeClr val="accent1"/>
+          </a:effectRef>
+          <a:fontRef idx="minor">
+            <a:schemeClr val="tx1"/>
+          </a:fontRef>
+        </p:style>
+      </p:cxnSp>
+    </p:spTree>
+    <p:extLst>
+      <p:ext uri="{BB962C8B-B14F-4D97-AF65-F5344CB8AC3E}">
+        <p14:creationId xmlns:p14="http://schemas.microsoft.com/office/powerpoint/2010/main" val="3931559329"/>
+      </p:ext>
+    </p:extLst>
+  </p:cSld>
+  <p:clrMapOvr>
+    <a:masterClrMapping/>
+  </p:clrMapOvr>
+</p:sld>
+</file>
+
+<file path=ppt/slides/slide4.xml><?xml version="1.0" encoding="utf-8"?>
+<p:sld xmlns:a="http://schemas.openxmlformats.org/drawingml/2006/main" xmlns:r="http://schemas.openxmlformats.org/officeDocument/2006/relationships" xmlns:p="http://schemas.openxmlformats.org/presentationml/2006/main" show="0">
+  <p:cSld>
+    <p:spTree>
+      <p:nvGrpSpPr>
+        <p:cNvPr id="1" name=""/>
+        <p:cNvGrpSpPr/>
+        <p:nvPr/>
+      </p:nvGrpSpPr>
+      <p:grpSpPr>
+        <a:xfrm>
+          <a:off x="0" y="0"/>
+          <a:ext cx="0" cy="0"/>
+          <a:chOff x="0" y="0"/>
+          <a:chExt cx="0" cy="0"/>
+        </a:xfrm>
+      </p:grpSpPr>
+      <p:sp>
+        <p:nvSpPr>
           <p:cNvPr id="12" name="Rechteck 11">
             <a:extLst>
               <a:ext uri="{FF2B5EF4-FFF2-40B4-BE49-F238E27FC236}">
@@ -9311,8 +10829,8 @@
 </p:sld>
 </file>
 
-<file path=ppt/slides/slide4.xml><?xml version="1.0" encoding="utf-8"?>
-<p:sld xmlns:a="http://schemas.openxmlformats.org/drawingml/2006/main" xmlns:r="http://schemas.openxmlformats.org/officeDocument/2006/relationships" xmlns:p="http://schemas.openxmlformats.org/presentationml/2006/main">
+<file path=ppt/slides/slide5.xml><?xml version="1.0" encoding="utf-8"?>
+<p:sld xmlns:a="http://schemas.openxmlformats.org/drawingml/2006/main" xmlns:r="http://schemas.openxmlformats.org/officeDocument/2006/relationships" xmlns:p="http://schemas.openxmlformats.org/presentationml/2006/main" show="0">
   <p:cSld>
     <p:spTree>
       <p:nvGrpSpPr>

</xml_diff>